<commit_message>
Fixed ros_node dia and added hough circle summarys and binary ops figs
</commit_message>
<xml_diff>
--- a/Figures.pptx
+++ b/Figures.pptx
@@ -10,6 +10,9 @@
     <p:sldId id="258" r:id="rId4"/>
     <p:sldId id="259" r:id="rId5"/>
     <p:sldId id="260" r:id="rId6"/>
+    <p:sldId id="261" r:id="rId7"/>
+    <p:sldId id="262" r:id="rId8"/>
+    <p:sldId id="263" r:id="rId9"/>
   </p:sldIdLst>
   <p:sldSz cx="16459200" cy="6858000"/>
   <p:notesSz cx="6858000" cy="9144000"/>
@@ -108,6 +111,11 @@
       </a:defRPr>
     </a:lvl9pPr>
   </p:defaultTextStyle>
+  <p:extLst>
+    <p:ext uri="{EFAFB233-063F-42B5-8137-9DF3F51BA10A}">
+      <p15:sldGuideLst xmlns:p15="http://schemas.microsoft.com/office/powerpoint/2012/main"/>
+    </p:ext>
+  </p:extLst>
 </p:presentation>
 </file>
 
@@ -242,7 +250,7 @@
           <a:p>
             <a:fld id="{CE4549E2-DFD0-412E-84C2-A8F2ECB6830C}" type="datetimeFigureOut">
               <a:rPr lang="en-US" smtClean="0"/>
-              <a:t>8/29/2016</a:t>
+              <a:t>8/30/2016</a:t>
             </a:fld>
             <a:endParaRPr lang="en-US"/>
           </a:p>
@@ -412,7 +420,7 @@
           <a:p>
             <a:fld id="{CE4549E2-DFD0-412E-84C2-A8F2ECB6830C}" type="datetimeFigureOut">
               <a:rPr lang="en-US" smtClean="0"/>
-              <a:t>8/29/2016</a:t>
+              <a:t>8/30/2016</a:t>
             </a:fld>
             <a:endParaRPr lang="en-US"/>
           </a:p>
@@ -592,7 +600,7 @@
           <a:p>
             <a:fld id="{CE4549E2-DFD0-412E-84C2-A8F2ECB6830C}" type="datetimeFigureOut">
               <a:rPr lang="en-US" smtClean="0"/>
-              <a:t>8/29/2016</a:t>
+              <a:t>8/30/2016</a:t>
             </a:fld>
             <a:endParaRPr lang="en-US"/>
           </a:p>
@@ -762,7 +770,7 @@
           <a:p>
             <a:fld id="{CE4549E2-DFD0-412E-84C2-A8F2ECB6830C}" type="datetimeFigureOut">
               <a:rPr lang="en-US" smtClean="0"/>
-              <a:t>8/29/2016</a:t>
+              <a:t>8/30/2016</a:t>
             </a:fld>
             <a:endParaRPr lang="en-US"/>
           </a:p>
@@ -1008,7 +1016,7 @@
           <a:p>
             <a:fld id="{CE4549E2-DFD0-412E-84C2-A8F2ECB6830C}" type="datetimeFigureOut">
               <a:rPr lang="en-US" smtClean="0"/>
-              <a:t>8/29/2016</a:t>
+              <a:t>8/30/2016</a:t>
             </a:fld>
             <a:endParaRPr lang="en-US"/>
           </a:p>
@@ -1240,7 +1248,7 @@
           <a:p>
             <a:fld id="{CE4549E2-DFD0-412E-84C2-A8F2ECB6830C}" type="datetimeFigureOut">
               <a:rPr lang="en-US" smtClean="0"/>
-              <a:t>8/29/2016</a:t>
+              <a:t>8/30/2016</a:t>
             </a:fld>
             <a:endParaRPr lang="en-US"/>
           </a:p>
@@ -1607,7 +1615,7 @@
           <a:p>
             <a:fld id="{CE4549E2-DFD0-412E-84C2-A8F2ECB6830C}" type="datetimeFigureOut">
               <a:rPr lang="en-US" smtClean="0"/>
-              <a:t>8/29/2016</a:t>
+              <a:t>8/30/2016</a:t>
             </a:fld>
             <a:endParaRPr lang="en-US"/>
           </a:p>
@@ -1725,7 +1733,7 @@
           <a:p>
             <a:fld id="{CE4549E2-DFD0-412E-84C2-A8F2ECB6830C}" type="datetimeFigureOut">
               <a:rPr lang="en-US" smtClean="0"/>
-              <a:t>8/29/2016</a:t>
+              <a:t>8/30/2016</a:t>
             </a:fld>
             <a:endParaRPr lang="en-US"/>
           </a:p>
@@ -1820,7 +1828,7 @@
           <a:p>
             <a:fld id="{CE4549E2-DFD0-412E-84C2-A8F2ECB6830C}" type="datetimeFigureOut">
               <a:rPr lang="en-US" smtClean="0"/>
-              <a:t>8/29/2016</a:t>
+              <a:t>8/30/2016</a:t>
             </a:fld>
             <a:endParaRPr lang="en-US"/>
           </a:p>
@@ -2097,7 +2105,7 @@
           <a:p>
             <a:fld id="{CE4549E2-DFD0-412E-84C2-A8F2ECB6830C}" type="datetimeFigureOut">
               <a:rPr lang="en-US" smtClean="0"/>
-              <a:t>8/29/2016</a:t>
+              <a:t>8/30/2016</a:t>
             </a:fld>
             <a:endParaRPr lang="en-US"/>
           </a:p>
@@ -2354,7 +2362,7 @@
           <a:p>
             <a:fld id="{CE4549E2-DFD0-412E-84C2-A8F2ECB6830C}" type="datetimeFigureOut">
               <a:rPr lang="en-US" smtClean="0"/>
-              <a:t>8/29/2016</a:t>
+              <a:t>8/30/2016</a:t>
             </a:fld>
             <a:endParaRPr lang="en-US"/>
           </a:p>
@@ -2567,7 +2575,7 @@
           <a:p>
             <a:fld id="{CE4549E2-DFD0-412E-84C2-A8F2ECB6830C}" type="datetimeFigureOut">
               <a:rPr lang="en-US" smtClean="0"/>
-              <a:t>8/29/2016</a:t>
+              <a:t>8/30/2016</a:t>
             </a:fld>
             <a:endParaRPr lang="en-US"/>
           </a:p>
@@ -3885,37 +3893,37 @@
       </p:grpSpPr>
       <p:grpSp>
         <p:nvGrpSpPr>
-          <p:cNvPr id="37" name="Group 36"/>
+          <p:cNvPr id="4" name="Group 3"/>
           <p:cNvGrpSpPr/>
           <p:nvPr/>
         </p:nvGrpSpPr>
         <p:grpSpPr>
           <a:xfrm>
-            <a:off x="3878248" y="1752600"/>
-            <a:ext cx="4935524" cy="2889624"/>
-            <a:chOff x="1744647" y="1752600"/>
-            <a:chExt cx="4935524" cy="2889624"/>
+            <a:off x="9424665" y="1688272"/>
+            <a:ext cx="4962592" cy="2889624"/>
+            <a:chOff x="9424665" y="1688272"/>
+            <a:chExt cx="4962592" cy="2889624"/>
           </a:xfrm>
         </p:grpSpPr>
         <p:sp>
           <p:nvSpPr>
-            <p:cNvPr id="3" name="Oval 2"/>
+            <p:cNvPr id="2" name="Rectangle 1"/>
             <p:cNvSpPr/>
             <p:nvPr/>
           </p:nvSpPr>
           <p:spPr>
             <a:xfrm>
-              <a:off x="3762375" y="1752600"/>
-              <a:ext cx="914400" cy="914400"/>
+              <a:off x="9424665" y="1688272"/>
+              <a:ext cx="4937760" cy="2889504"/>
             </a:xfrm>
-            <a:prstGeom prst="ellipse">
+            <a:prstGeom prst="rect">
               <a:avLst/>
             </a:prstGeom>
-            <a:noFill/>
-            <a:ln w="12700">
-              <a:solidFill>
-                <a:schemeClr val="tx1"/>
-              </a:solidFill>
+            <a:solidFill>
+              <a:schemeClr val="bg1"/>
+            </a:solidFill>
+            <a:ln>
+              <a:noFill/>
             </a:ln>
           </p:spPr>
           <p:style>
@@ -3935,12 +3943,7 @@
             </a:fontRef>
           </p:style>
           <p:txBody>
-            <a:bodyPr rot="0" spcFirstLastPara="0" vertOverflow="overflow" horzOverflow="overflow" vert="horz" wrap="square" lIns="91440" tIns="45720" rIns="91440" bIns="45720" numCol="1" spcCol="0" rtlCol="0" fromWordArt="0" anchor="ctr" anchorCtr="0" forceAA="0" compatLnSpc="1">
-              <a:prstTxWarp prst="textNoShape">
-                <a:avLst/>
-              </a:prstTxWarp>
-              <a:noAutofit/>
-            </a:bodyPr>
+            <a:bodyPr rtlCol="0" anchor="ctr"/>
             <a:lstStyle/>
             <a:p>
               <a:pPr algn="ctr"/>
@@ -3948,856 +3951,922 @@
             </a:p>
           </p:txBody>
         </p:sp>
-        <p:sp>
-          <p:nvSpPr>
-            <p:cNvPr id="5" name="Rectangle 4"/>
-            <p:cNvSpPr/>
+        <p:grpSp>
+          <p:nvGrpSpPr>
+            <p:cNvPr id="37" name="Group 36"/>
+            <p:cNvGrpSpPr/>
             <p:nvPr/>
-          </p:nvSpPr>
-          <p:spPr>
+          </p:nvGrpSpPr>
+          <p:grpSpPr>
             <a:xfrm>
-              <a:off x="1744648" y="3301198"/>
-              <a:ext cx="1143000" cy="685800"/>
+              <a:off x="9451733" y="1688272"/>
+              <a:ext cx="4935524" cy="2889624"/>
+              <a:chOff x="1744647" y="1752600"/>
+              <a:chExt cx="4935524" cy="2889624"/>
             </a:xfrm>
-            <a:prstGeom prst="rect">
-              <a:avLst/>
-            </a:prstGeom>
-            <a:noFill/>
-            <a:ln w="19050">
+          </p:grpSpPr>
+          <p:sp>
+            <p:nvSpPr>
+              <p:cNvPr id="3" name="Oval 2"/>
+              <p:cNvSpPr/>
+              <p:nvPr/>
+            </p:nvSpPr>
+            <p:spPr>
+              <a:xfrm>
+                <a:off x="3762375" y="1752600"/>
+                <a:ext cx="914400" cy="914400"/>
+              </a:xfrm>
+              <a:prstGeom prst="ellipse">
+                <a:avLst/>
+              </a:prstGeom>
+              <a:noFill/>
+              <a:ln w="12700">
+                <a:solidFill>
+                  <a:schemeClr val="tx1"/>
+                </a:solidFill>
+              </a:ln>
+            </p:spPr>
+            <p:style>
+              <a:lnRef idx="2">
+                <a:schemeClr val="accent1">
+                  <a:shade val="50000"/>
+                </a:schemeClr>
+              </a:lnRef>
+              <a:fillRef idx="1">
+                <a:schemeClr val="accent1"/>
+              </a:fillRef>
+              <a:effectRef idx="0">
+                <a:schemeClr val="accent1"/>
+              </a:effectRef>
+              <a:fontRef idx="minor">
+                <a:schemeClr val="lt1"/>
+              </a:fontRef>
+            </p:style>
+            <p:txBody>
+              <a:bodyPr rot="0" spcFirstLastPara="0" vertOverflow="overflow" horzOverflow="overflow" vert="horz" wrap="square" lIns="91440" tIns="45720" rIns="91440" bIns="45720" numCol="1" spcCol="0" rtlCol="0" fromWordArt="0" anchor="ctr" anchorCtr="0" forceAA="0" compatLnSpc="1">
+                <a:prstTxWarp prst="textNoShape">
+                  <a:avLst/>
+                </a:prstTxWarp>
+                <a:noAutofit/>
+              </a:bodyPr>
+              <a:lstStyle/>
+              <a:p>
+                <a:pPr algn="ctr"/>
+                <a:endParaRPr lang="en-US"/>
+              </a:p>
+            </p:txBody>
+          </p:sp>
+          <p:sp>
+            <p:nvSpPr>
+              <p:cNvPr id="5" name="Rectangle 4"/>
+              <p:cNvSpPr/>
+              <p:nvPr/>
+            </p:nvSpPr>
+            <p:spPr>
+              <a:xfrm>
+                <a:off x="1744648" y="3301198"/>
+                <a:ext cx="1143000" cy="685800"/>
+              </a:xfrm>
+              <a:prstGeom prst="rect">
+                <a:avLst/>
+              </a:prstGeom>
+              <a:noFill/>
+              <a:ln w="19050">
+                <a:solidFill>
+                  <a:schemeClr val="tx1"/>
+                </a:solidFill>
+              </a:ln>
+            </p:spPr>
+            <p:style>
+              <a:lnRef idx="2">
+                <a:schemeClr val="accent1">
+                  <a:shade val="50000"/>
+                </a:schemeClr>
+              </a:lnRef>
+              <a:fillRef idx="1">
+                <a:schemeClr val="accent1"/>
+              </a:fillRef>
+              <a:effectRef idx="0">
+                <a:schemeClr val="accent1"/>
+              </a:effectRef>
+              <a:fontRef idx="minor">
+                <a:schemeClr val="lt1"/>
+              </a:fontRef>
+            </p:style>
+            <p:txBody>
+              <a:bodyPr rot="0" spcFirstLastPara="0" vertOverflow="overflow" horzOverflow="overflow" vert="horz" wrap="square" lIns="91440" tIns="45720" rIns="91440" bIns="45720" numCol="1" spcCol="0" rtlCol="0" fromWordArt="0" anchor="ctr" anchorCtr="0" forceAA="0" compatLnSpc="1">
+                <a:prstTxWarp prst="textNoShape">
+                  <a:avLst/>
+                </a:prstTxWarp>
+                <a:noAutofit/>
+              </a:bodyPr>
+              <a:lstStyle/>
+              <a:p>
+                <a:pPr algn="ctr"/>
+                <a:endParaRPr lang="en-US"/>
+              </a:p>
+            </p:txBody>
+          </p:sp>
+          <p:sp>
+            <p:nvSpPr>
+              <p:cNvPr id="25" name="Rectangle 24"/>
+              <p:cNvSpPr/>
+              <p:nvPr/>
+            </p:nvSpPr>
+            <p:spPr>
+              <a:xfrm>
+                <a:off x="5537171" y="3301198"/>
+                <a:ext cx="1143000" cy="685800"/>
+              </a:xfrm>
+              <a:prstGeom prst="rect">
+                <a:avLst/>
+              </a:prstGeom>
+              <a:noFill/>
+              <a:ln w="19050">
+                <a:solidFill>
+                  <a:schemeClr val="tx1"/>
+                </a:solidFill>
+              </a:ln>
+            </p:spPr>
+            <p:style>
+              <a:lnRef idx="2">
+                <a:schemeClr val="accent1">
+                  <a:shade val="50000"/>
+                </a:schemeClr>
+              </a:lnRef>
+              <a:fillRef idx="1">
+                <a:schemeClr val="accent1"/>
+              </a:fillRef>
+              <a:effectRef idx="0">
+                <a:schemeClr val="accent1"/>
+              </a:effectRef>
+              <a:fontRef idx="minor">
+                <a:schemeClr val="lt1"/>
+              </a:fontRef>
+            </p:style>
+            <p:txBody>
+              <a:bodyPr rot="0" spcFirstLastPara="0" vertOverflow="overflow" horzOverflow="overflow" vert="horz" wrap="square" lIns="91440" tIns="45720" rIns="91440" bIns="45720" numCol="1" spcCol="0" rtlCol="0" fromWordArt="0" anchor="ctr" anchorCtr="0" forceAA="0" compatLnSpc="1">
+                <a:prstTxWarp prst="textNoShape">
+                  <a:avLst/>
+                </a:prstTxWarp>
+                <a:noAutofit/>
+              </a:bodyPr>
+              <a:lstStyle/>
+              <a:p>
+                <a:pPr algn="ctr"/>
+                <a:endParaRPr lang="en-US"/>
+              </a:p>
+            </p:txBody>
+          </p:sp>
+          <p:sp>
+            <p:nvSpPr>
+              <p:cNvPr id="7" name="Flowchart: Data 6"/>
+              <p:cNvSpPr/>
+              <p:nvPr/>
+            </p:nvSpPr>
+            <p:spPr>
+              <a:xfrm>
+                <a:off x="3688577" y="3419059"/>
+                <a:ext cx="1051560" cy="438912"/>
+              </a:xfrm>
+              <a:prstGeom prst="flowChartInputOutput">
+                <a:avLst/>
+              </a:prstGeom>
+              <a:noFill/>
+              <a:ln w="19050">
+                <a:solidFill>
+                  <a:schemeClr val="tx1"/>
+                </a:solidFill>
+              </a:ln>
+            </p:spPr>
+            <p:style>
+              <a:lnRef idx="2">
+                <a:schemeClr val="accent1">
+                  <a:shade val="50000"/>
+                </a:schemeClr>
+              </a:lnRef>
+              <a:fillRef idx="1">
+                <a:schemeClr val="accent1"/>
+              </a:fillRef>
+              <a:effectRef idx="0">
+                <a:schemeClr val="accent1"/>
+              </a:effectRef>
+              <a:fontRef idx="minor">
+                <a:schemeClr val="lt1"/>
+              </a:fontRef>
+            </p:style>
+            <p:txBody>
+              <a:bodyPr rot="0" spcFirstLastPara="0" vertOverflow="overflow" horzOverflow="overflow" vert="horz" wrap="square" lIns="91440" tIns="45720" rIns="91440" bIns="45720" numCol="1" spcCol="0" rtlCol="0" fromWordArt="0" anchor="ctr" anchorCtr="0" forceAA="0" compatLnSpc="1">
+                <a:prstTxWarp prst="textNoShape">
+                  <a:avLst/>
+                </a:prstTxWarp>
+                <a:noAutofit/>
+              </a:bodyPr>
+              <a:lstStyle/>
+              <a:p>
+                <a:pPr algn="ctr"/>
+                <a:endParaRPr lang="en-US"/>
+              </a:p>
+            </p:txBody>
+          </p:sp>
+          <p:sp>
+            <p:nvSpPr>
+              <p:cNvPr id="8" name="Flowchart: Terminator 7"/>
+              <p:cNvSpPr/>
+              <p:nvPr/>
+            </p:nvSpPr>
+            <p:spPr>
+              <a:xfrm>
+                <a:off x="3756399" y="4280274"/>
+                <a:ext cx="914400" cy="361950"/>
+              </a:xfrm>
+              <a:prstGeom prst="flowChartTerminator">
+                <a:avLst/>
+              </a:prstGeom>
+              <a:noFill/>
+              <a:ln w="19050">
+                <a:solidFill>
+                  <a:schemeClr val="tx1"/>
+                </a:solidFill>
+              </a:ln>
+            </p:spPr>
+            <p:style>
+              <a:lnRef idx="2">
+                <a:schemeClr val="dk1">
+                  <a:shade val="50000"/>
+                </a:schemeClr>
+              </a:lnRef>
+              <a:fillRef idx="1">
+                <a:schemeClr val="dk1"/>
+              </a:fillRef>
+              <a:effectRef idx="0">
+                <a:schemeClr val="dk1"/>
+              </a:effectRef>
+              <a:fontRef idx="minor">
+                <a:schemeClr val="lt1"/>
+              </a:fontRef>
+            </p:style>
+            <p:txBody>
+              <a:bodyPr rot="0" spcFirstLastPara="0" vertOverflow="overflow" horzOverflow="overflow" vert="horz" wrap="square" lIns="91440" tIns="45720" rIns="91440" bIns="45720" numCol="1" spcCol="0" rtlCol="0" fromWordArt="0" anchor="ctr" anchorCtr="0" forceAA="0" compatLnSpc="1">
+                <a:prstTxWarp prst="textNoShape">
+                  <a:avLst/>
+                </a:prstTxWarp>
+                <a:noAutofit/>
+              </a:bodyPr>
+              <a:lstStyle/>
+              <a:p>
+                <a:pPr algn="ctr"/>
+                <a:endParaRPr lang="en-US"/>
+              </a:p>
+            </p:txBody>
+          </p:sp>
+          <p:cxnSp>
+            <p:nvCxnSpPr>
+              <p:cNvPr id="10" name="Straight Arrow Connector 9"/>
+              <p:cNvCxnSpPr>
+                <a:stCxn id="5" idx="0"/>
+                <a:endCxn id="3" idx="2"/>
+              </p:cNvCxnSpPr>
+              <p:nvPr/>
+            </p:nvCxnSpPr>
+            <p:spPr>
+              <a:xfrm flipV="1">
+                <a:off x="2316148" y="2209800"/>
+                <a:ext cx="1446227" cy="1091398"/>
+              </a:xfrm>
+              <a:prstGeom prst="straightConnector1">
+                <a:avLst/>
+              </a:prstGeom>
+              <a:ln w="12700">
+                <a:prstDash val="dash"/>
+                <a:headEnd type="triangle"/>
+                <a:tailEnd type="triangle"/>
+              </a:ln>
+            </p:spPr>
+            <p:style>
+              <a:lnRef idx="1">
+                <a:schemeClr val="dk1"/>
+              </a:lnRef>
+              <a:fillRef idx="0">
+                <a:schemeClr val="dk1"/>
+              </a:fillRef>
+              <a:effectRef idx="0">
+                <a:schemeClr val="dk1"/>
+              </a:effectRef>
+              <a:fontRef idx="minor">
+                <a:schemeClr val="tx1"/>
+              </a:fontRef>
+            </p:style>
+          </p:cxnSp>
+          <p:cxnSp>
+            <p:nvCxnSpPr>
+              <p:cNvPr id="34" name="Straight Arrow Connector 33"/>
+              <p:cNvCxnSpPr>
+                <a:stCxn id="3" idx="6"/>
+                <a:endCxn id="25" idx="0"/>
+              </p:cNvCxnSpPr>
+              <p:nvPr/>
+            </p:nvCxnSpPr>
+            <p:spPr>
+              <a:xfrm>
+                <a:off x="4676775" y="2209800"/>
+                <a:ext cx="1431896" cy="1091398"/>
+              </a:xfrm>
+              <a:prstGeom prst="straightConnector1">
+                <a:avLst/>
+              </a:prstGeom>
+              <a:ln w="12700">
+                <a:prstDash val="dash"/>
+                <a:headEnd type="triangle"/>
+                <a:tailEnd type="triangle"/>
+              </a:ln>
+            </p:spPr>
+            <p:style>
+              <a:lnRef idx="1">
+                <a:schemeClr val="dk1"/>
+              </a:lnRef>
+              <a:fillRef idx="0">
+                <a:schemeClr val="dk1"/>
+              </a:fillRef>
+              <a:effectRef idx="0">
+                <a:schemeClr val="dk1"/>
+              </a:effectRef>
+              <a:fontRef idx="minor">
+                <a:schemeClr val="tx1"/>
+              </a:fontRef>
+            </p:style>
+          </p:cxnSp>
+          <p:sp>
+            <p:nvSpPr>
+              <p:cNvPr id="18" name="TextBox 17"/>
+              <p:cNvSpPr txBox="1"/>
+              <p:nvPr/>
+            </p:nvSpPr>
+            <p:spPr>
+              <a:xfrm>
+                <a:off x="2535985" y="2620212"/>
+                <a:ext cx="1043923" cy="523220"/>
+              </a:xfrm>
+              <a:prstGeom prst="rect">
+                <a:avLst/>
+              </a:prstGeom>
               <a:solidFill>
+                <a:schemeClr val="bg1"/>
+              </a:solidFill>
+            </p:spPr>
+            <p:txBody>
+              <a:bodyPr wrap="square" rtlCol="0">
+                <a:spAutoFit/>
+              </a:bodyPr>
+              <a:lstStyle/>
+              <a:p>
+                <a:pPr algn="ctr"/>
+                <a:r>
+                  <a:rPr lang="en-US" sz="1400" dirty="0">
+                    <a:latin typeface="Garamond" panose="02020404030301010803" pitchFamily="18" charset="0"/>
+                  </a:rPr>
+                  <a:t>Registration Information</a:t>
+                </a:r>
+              </a:p>
+            </p:txBody>
+          </p:sp>
+          <p:cxnSp>
+            <p:nvCxnSpPr>
+              <p:cNvPr id="20" name="Curved Connector 19"/>
+              <p:cNvCxnSpPr>
+                <a:stCxn id="8" idx="1"/>
+                <a:endCxn id="5" idx="2"/>
+              </p:cNvCxnSpPr>
+              <p:nvPr/>
+            </p:nvCxnSpPr>
+            <p:spPr>
+              <a:xfrm rot="10800000">
+                <a:off x="2316149" y="3986999"/>
+                <a:ext cx="1440251" cy="474251"/>
+              </a:xfrm>
+              <a:prstGeom prst="curvedConnector2">
+                <a:avLst/>
+              </a:prstGeom>
+              <a:ln w="12700">
+                <a:prstDash val="sysDot"/>
+                <a:tailEnd type="triangle"/>
+              </a:ln>
+            </p:spPr>
+            <p:style>
+              <a:lnRef idx="1">
+                <a:schemeClr val="dk1"/>
+              </a:lnRef>
+              <a:fillRef idx="0">
+                <a:schemeClr val="dk1"/>
+              </a:fillRef>
+              <a:effectRef idx="0">
+                <a:schemeClr val="dk1"/>
+              </a:effectRef>
+              <a:fontRef idx="minor">
                 <a:schemeClr val="tx1"/>
+              </a:fontRef>
+            </p:style>
+          </p:cxnSp>
+          <p:cxnSp>
+            <p:nvCxnSpPr>
+              <p:cNvPr id="43" name="Curved Connector 42"/>
+              <p:cNvCxnSpPr>
+                <a:endCxn id="25" idx="2"/>
+              </p:cNvCxnSpPr>
+              <p:nvPr/>
+            </p:nvCxnSpPr>
+            <p:spPr>
+              <a:xfrm flipV="1">
+                <a:off x="4676775" y="3986998"/>
+                <a:ext cx="1431896" cy="480227"/>
+              </a:xfrm>
+              <a:prstGeom prst="curvedConnector2">
+                <a:avLst/>
+              </a:prstGeom>
+              <a:ln w="12700">
+                <a:solidFill>
+                  <a:schemeClr val="tx1"/>
+                </a:solidFill>
+                <a:prstDash val="sysDot"/>
+                <a:tailEnd type="triangle"/>
+              </a:ln>
+            </p:spPr>
+            <p:style>
+              <a:lnRef idx="1">
+                <a:schemeClr val="dk1"/>
+              </a:lnRef>
+              <a:fillRef idx="0">
+                <a:schemeClr val="dk1"/>
+              </a:fillRef>
+              <a:effectRef idx="0">
+                <a:schemeClr val="dk1"/>
+              </a:effectRef>
+              <a:fontRef idx="minor">
+                <a:schemeClr val="tx1"/>
+              </a:fontRef>
+            </p:style>
+          </p:cxnSp>
+          <p:sp>
+            <p:nvSpPr>
+              <p:cNvPr id="48" name="TextBox 47"/>
+              <p:cNvSpPr txBox="1"/>
+              <p:nvPr/>
+            </p:nvSpPr>
+            <p:spPr>
+              <a:xfrm>
+                <a:off x="1744647" y="3473647"/>
+                <a:ext cx="1143001" cy="307777"/>
+              </a:xfrm>
+              <a:prstGeom prst="rect">
+                <a:avLst/>
+              </a:prstGeom>
+              <a:noFill/>
+            </p:spPr>
+            <p:txBody>
+              <a:bodyPr wrap="square" rtlCol="0">
+                <a:spAutoFit/>
+              </a:bodyPr>
+              <a:lstStyle/>
+              <a:p>
+                <a:pPr algn="ctr"/>
+                <a:r>
+                  <a:rPr lang="en-US" sz="1400" dirty="0">
+                    <a:latin typeface="Garamond" panose="02020404030301010803" pitchFamily="18" charset="0"/>
+                  </a:rPr>
+                  <a:t>Node A</a:t>
+                </a:r>
+              </a:p>
+            </p:txBody>
+          </p:sp>
+          <p:sp>
+            <p:nvSpPr>
+              <p:cNvPr id="50" name="TextBox 49"/>
+              <p:cNvSpPr txBox="1"/>
+              <p:nvPr/>
+            </p:nvSpPr>
+            <p:spPr>
+              <a:xfrm>
+                <a:off x="1744647" y="3740777"/>
+                <a:ext cx="1143001" cy="246221"/>
+              </a:xfrm>
+              <a:prstGeom prst="rect">
+                <a:avLst/>
+              </a:prstGeom>
+              <a:noFill/>
+            </p:spPr>
+            <p:txBody>
+              <a:bodyPr wrap="square" rtlCol="0">
+                <a:spAutoFit/>
+              </a:bodyPr>
+              <a:lstStyle/>
+              <a:p>
+                <a:pPr algn="ctr"/>
+                <a:r>
+                  <a:rPr lang="en-US" sz="1000" dirty="0">
+                    <a:latin typeface="Garamond" panose="02020404030301010803" pitchFamily="18" charset="0"/>
+                  </a:rPr>
+                  <a:t>Server</a:t>
+                </a:r>
+              </a:p>
+            </p:txBody>
+          </p:sp>
+          <p:sp>
+            <p:nvSpPr>
+              <p:cNvPr id="51" name="TextBox 50"/>
+              <p:cNvSpPr txBox="1"/>
+              <p:nvPr/>
+            </p:nvSpPr>
+            <p:spPr>
+              <a:xfrm>
+                <a:off x="5537170" y="3740777"/>
+                <a:ext cx="1143001" cy="246221"/>
+              </a:xfrm>
+              <a:prstGeom prst="rect">
+                <a:avLst/>
+              </a:prstGeom>
+              <a:noFill/>
+            </p:spPr>
+            <p:txBody>
+              <a:bodyPr wrap="square" rtlCol="0">
+                <a:spAutoFit/>
+              </a:bodyPr>
+              <a:lstStyle/>
+              <a:p>
+                <a:pPr algn="ctr"/>
+                <a:r>
+                  <a:rPr lang="en-US" sz="1000" dirty="0">
+                    <a:latin typeface="Garamond" panose="02020404030301010803" pitchFamily="18" charset="0"/>
+                  </a:rPr>
+                  <a:t>Client</a:t>
+                </a:r>
+              </a:p>
+            </p:txBody>
+          </p:sp>
+          <p:sp>
+            <p:nvSpPr>
+              <p:cNvPr id="55" name="TextBox 54"/>
+              <p:cNvSpPr txBox="1"/>
+              <p:nvPr/>
+            </p:nvSpPr>
+            <p:spPr>
+              <a:xfrm>
+                <a:off x="5537169" y="3473647"/>
+                <a:ext cx="1143001" cy="307777"/>
+              </a:xfrm>
+              <a:prstGeom prst="rect">
+                <a:avLst/>
+              </a:prstGeom>
+              <a:noFill/>
+            </p:spPr>
+            <p:txBody>
+              <a:bodyPr wrap="square" rtlCol="0">
+                <a:spAutoFit/>
+              </a:bodyPr>
+              <a:lstStyle/>
+              <a:p>
+                <a:pPr algn="ctr"/>
+                <a:r>
+                  <a:rPr lang="en-US" sz="1400" dirty="0">
+                    <a:latin typeface="Garamond" panose="02020404030301010803" pitchFamily="18" charset="0"/>
+                  </a:rPr>
+                  <a:t>Node A</a:t>
+                </a:r>
+              </a:p>
+            </p:txBody>
+          </p:sp>
+          <p:sp>
+            <p:nvSpPr>
+              <p:cNvPr id="56" name="TextBox 55"/>
+              <p:cNvSpPr txBox="1"/>
+              <p:nvPr/>
+            </p:nvSpPr>
+            <p:spPr>
+              <a:xfrm>
+                <a:off x="3762375" y="1919300"/>
+                <a:ext cx="914400" cy="523220"/>
+              </a:xfrm>
+              <a:prstGeom prst="rect">
+                <a:avLst/>
+              </a:prstGeom>
+              <a:noFill/>
+            </p:spPr>
+            <p:txBody>
+              <a:bodyPr wrap="square" rtlCol="0">
+                <a:spAutoFit/>
+              </a:bodyPr>
+              <a:lstStyle/>
+              <a:p>
+                <a:pPr algn="ctr"/>
+                <a:r>
+                  <a:rPr lang="en-US" sz="1400" dirty="0">
+                    <a:latin typeface="Garamond" panose="02020404030301010803" pitchFamily="18" charset="0"/>
+                  </a:rPr>
+                  <a:t>ROS Master</a:t>
+                </a:r>
+              </a:p>
+            </p:txBody>
+          </p:sp>
+          <p:sp>
+            <p:nvSpPr>
+              <p:cNvPr id="58" name="TextBox 57"/>
+              <p:cNvSpPr txBox="1"/>
+              <p:nvPr/>
+            </p:nvSpPr>
+            <p:spPr>
+              <a:xfrm>
+                <a:off x="3674230" y="3405313"/>
+                <a:ext cx="1055457" cy="461665"/>
+              </a:xfrm>
+              <a:prstGeom prst="rect">
+                <a:avLst/>
+              </a:prstGeom>
+              <a:noFill/>
+            </p:spPr>
+            <p:txBody>
+              <a:bodyPr wrap="square" rtlCol="0">
+                <a:spAutoFit/>
+              </a:bodyPr>
+              <a:lstStyle/>
+              <a:p>
+                <a:pPr algn="ctr"/>
+                <a:r>
+                  <a:rPr lang="en-US" sz="1200" dirty="0">
+                    <a:latin typeface="Garamond" panose="02020404030301010803" pitchFamily="18" charset="0"/>
+                  </a:rPr>
+                  <a:t>Message Topic</a:t>
+                </a:r>
+              </a:p>
+            </p:txBody>
+          </p:sp>
+          <p:sp>
+            <p:nvSpPr>
+              <p:cNvPr id="59" name="TextBox 58"/>
+              <p:cNvSpPr txBox="1"/>
+              <p:nvPr/>
+            </p:nvSpPr>
+            <p:spPr>
+              <a:xfrm rot="16200000">
+                <a:off x="2433748" y="3522815"/>
+                <a:ext cx="682144" cy="246221"/>
+              </a:xfrm>
+              <a:prstGeom prst="rect">
+                <a:avLst/>
+              </a:prstGeom>
+              <a:noFill/>
+            </p:spPr>
+            <p:txBody>
+              <a:bodyPr wrap="square" rtlCol="0">
+                <a:spAutoFit/>
+              </a:bodyPr>
+              <a:lstStyle/>
+              <a:p>
+                <a:pPr algn="ctr"/>
+                <a:r>
+                  <a:rPr lang="en-US" sz="1000" dirty="0">
+                    <a:latin typeface="Garamond" panose="02020404030301010803" pitchFamily="18" charset="0"/>
+                  </a:rPr>
+                  <a:t>Publisher</a:t>
+                </a:r>
+              </a:p>
+            </p:txBody>
+          </p:sp>
+          <p:sp>
+            <p:nvSpPr>
+              <p:cNvPr id="64" name="TextBox 63"/>
+              <p:cNvSpPr txBox="1"/>
+              <p:nvPr/>
+            </p:nvSpPr>
+            <p:spPr>
+              <a:xfrm rot="16200000">
+                <a:off x="5292724" y="3523264"/>
+                <a:ext cx="714212" cy="246221"/>
+              </a:xfrm>
+              <a:prstGeom prst="rect">
+                <a:avLst/>
+              </a:prstGeom>
+              <a:noFill/>
+            </p:spPr>
+            <p:txBody>
+              <a:bodyPr wrap="square" rtlCol="0">
+                <a:spAutoFit/>
+              </a:bodyPr>
+              <a:lstStyle/>
+              <a:p>
+                <a:pPr algn="ctr"/>
+                <a:r>
+                  <a:rPr lang="en-US" sz="1000" dirty="0">
+                    <a:latin typeface="Garamond" panose="02020404030301010803" pitchFamily="18" charset="0"/>
+                  </a:rPr>
+                  <a:t>Subscriber</a:t>
+                </a:r>
+              </a:p>
+            </p:txBody>
+          </p:sp>
+          <p:sp>
+            <p:nvSpPr>
+              <p:cNvPr id="68" name="TextBox 67"/>
+              <p:cNvSpPr txBox="1"/>
+              <p:nvPr/>
+            </p:nvSpPr>
+            <p:spPr>
+              <a:xfrm>
+                <a:off x="3722615" y="4329063"/>
+                <a:ext cx="984927" cy="276999"/>
+              </a:xfrm>
+              <a:prstGeom prst="rect">
+                <a:avLst/>
+              </a:prstGeom>
+              <a:noFill/>
+            </p:spPr>
+            <p:txBody>
+              <a:bodyPr wrap="square" rtlCol="0">
+                <a:spAutoFit/>
+              </a:bodyPr>
+              <a:lstStyle/>
+              <a:p>
+                <a:pPr algn="ctr"/>
+                <a:r>
+                  <a:rPr lang="en-US" sz="1200" dirty="0">
+                    <a:latin typeface="Garamond" panose="02020404030301010803" pitchFamily="18" charset="0"/>
+                  </a:rPr>
+                  <a:t>Service Topic</a:t>
+                </a:r>
+              </a:p>
+            </p:txBody>
+          </p:sp>
+          <p:sp>
+            <p:nvSpPr>
+              <p:cNvPr id="69" name="TextBox 68"/>
+              <p:cNvSpPr txBox="1"/>
+              <p:nvPr/>
+            </p:nvSpPr>
+            <p:spPr>
+              <a:xfrm>
+                <a:off x="2661948" y="4238936"/>
+                <a:ext cx="625112" cy="246221"/>
+              </a:xfrm>
+              <a:prstGeom prst="rect">
+                <a:avLst/>
+              </a:prstGeom>
+              <a:solidFill>
+                <a:schemeClr val="bg1"/>
               </a:solidFill>
-            </a:ln>
-          </p:spPr>
-          <p:style>
-            <a:lnRef idx="2">
-              <a:schemeClr val="accent1">
-                <a:shade val="50000"/>
-              </a:schemeClr>
-            </a:lnRef>
-            <a:fillRef idx="1">
-              <a:schemeClr val="accent1"/>
-            </a:fillRef>
-            <a:effectRef idx="0">
-              <a:schemeClr val="accent1"/>
-            </a:effectRef>
-            <a:fontRef idx="minor">
-              <a:schemeClr val="lt1"/>
-            </a:fontRef>
-          </p:style>
-          <p:txBody>
-            <a:bodyPr rot="0" spcFirstLastPara="0" vertOverflow="overflow" horzOverflow="overflow" vert="horz" wrap="square" lIns="91440" tIns="45720" rIns="91440" bIns="45720" numCol="1" spcCol="0" rtlCol="0" fromWordArt="0" anchor="ctr" anchorCtr="0" forceAA="0" compatLnSpc="1">
-              <a:prstTxWarp prst="textNoShape">
+            </p:spPr>
+            <p:txBody>
+              <a:bodyPr wrap="square" rtlCol="0">
+                <a:spAutoFit/>
+              </a:bodyPr>
+              <a:lstStyle/>
+              <a:p>
+                <a:pPr algn="ctr"/>
+                <a:r>
+                  <a:rPr lang="en-US" sz="1000" dirty="0">
+                    <a:latin typeface="Garamond" panose="02020404030301010803" pitchFamily="18" charset="0"/>
+                  </a:rPr>
+                  <a:t>Request</a:t>
+                </a:r>
+              </a:p>
+            </p:txBody>
+          </p:sp>
+          <p:sp>
+            <p:nvSpPr>
+              <p:cNvPr id="72" name="TextBox 71"/>
+              <p:cNvSpPr txBox="1"/>
+              <p:nvPr/>
+            </p:nvSpPr>
+            <p:spPr>
+              <a:xfrm>
+                <a:off x="5183952" y="4253203"/>
+                <a:ext cx="485799" cy="246221"/>
+              </a:xfrm>
+              <a:prstGeom prst="rect">
                 <a:avLst/>
-              </a:prstTxWarp>
-              <a:noAutofit/>
-            </a:bodyPr>
-            <a:lstStyle/>
-            <a:p>
-              <a:pPr algn="ctr"/>
-              <a:endParaRPr lang="en-US"/>
-            </a:p>
-          </p:txBody>
-        </p:sp>
-        <p:sp>
-          <p:nvSpPr>
-            <p:cNvPr id="25" name="Rectangle 24"/>
-            <p:cNvSpPr/>
-            <p:nvPr/>
-          </p:nvSpPr>
-          <p:spPr>
-            <a:xfrm>
-              <a:off x="5537171" y="3301198"/>
-              <a:ext cx="1143000" cy="685800"/>
-            </a:xfrm>
-            <a:prstGeom prst="rect">
-              <a:avLst/>
-            </a:prstGeom>
-            <a:noFill/>
-            <a:ln w="19050">
+              </a:prstGeom>
               <a:solidFill>
+                <a:schemeClr val="bg1"/>
+              </a:solidFill>
+            </p:spPr>
+            <p:txBody>
+              <a:bodyPr wrap="square" rtlCol="0">
+                <a:spAutoFit/>
+              </a:bodyPr>
+              <a:lstStyle/>
+              <a:p>
+                <a:pPr algn="ctr"/>
+                <a:r>
+                  <a:rPr lang="en-US" sz="1000" dirty="0">
+                    <a:latin typeface="Garamond" panose="02020404030301010803" pitchFamily="18" charset="0"/>
+                  </a:rPr>
+                  <a:t>Reply</a:t>
+                </a:r>
+              </a:p>
+            </p:txBody>
+          </p:sp>
+          <p:cxnSp>
+            <p:nvCxnSpPr>
+              <p:cNvPr id="28" name="Straight Connector 27"/>
+              <p:cNvCxnSpPr>
+                <a:stCxn id="59" idx="2"/>
+                <a:endCxn id="58" idx="1"/>
+              </p:cNvCxnSpPr>
+              <p:nvPr/>
+            </p:nvCxnSpPr>
+            <p:spPr>
+              <a:xfrm flipV="1">
+                <a:off x="2897931" y="3636146"/>
+                <a:ext cx="776299" cy="9780"/>
+              </a:xfrm>
+              <a:prstGeom prst="line">
+                <a:avLst/>
+              </a:prstGeom>
+              <a:ln w="12700"/>
+            </p:spPr>
+            <p:style>
+              <a:lnRef idx="1">
+                <a:schemeClr val="dk1"/>
+              </a:lnRef>
+              <a:fillRef idx="0">
+                <a:schemeClr val="dk1"/>
+              </a:fillRef>
+              <a:effectRef idx="0">
+                <a:schemeClr val="dk1"/>
+              </a:effectRef>
+              <a:fontRef idx="minor">
                 <a:schemeClr val="tx1"/>
+              </a:fontRef>
+            </p:style>
+          </p:cxnSp>
+          <p:cxnSp>
+            <p:nvCxnSpPr>
+              <p:cNvPr id="33" name="Straight Arrow Connector 32"/>
+              <p:cNvCxnSpPr>
+                <a:stCxn id="58" idx="3"/>
+                <a:endCxn id="64" idx="0"/>
+              </p:cNvCxnSpPr>
+              <p:nvPr/>
+            </p:nvCxnSpPr>
+            <p:spPr>
+              <a:xfrm>
+                <a:off x="4729687" y="3636146"/>
+                <a:ext cx="797033" cy="10229"/>
+              </a:xfrm>
+              <a:prstGeom prst="straightConnector1">
+                <a:avLst/>
+              </a:prstGeom>
+              <a:ln w="12700">
+                <a:tailEnd type="triangle"/>
+              </a:ln>
+            </p:spPr>
+            <p:style>
+              <a:lnRef idx="1">
+                <a:schemeClr val="dk1"/>
+              </a:lnRef>
+              <a:fillRef idx="0">
+                <a:schemeClr val="dk1"/>
+              </a:fillRef>
+              <a:effectRef idx="0">
+                <a:schemeClr val="dk1"/>
+              </a:effectRef>
+              <a:fontRef idx="minor">
+                <a:schemeClr val="tx1"/>
+              </a:fontRef>
+            </p:style>
+          </p:cxnSp>
+          <p:sp>
+            <p:nvSpPr>
+              <p:cNvPr id="73" name="TextBox 72"/>
+              <p:cNvSpPr txBox="1"/>
+              <p:nvPr/>
+            </p:nvSpPr>
+            <p:spPr>
+              <a:xfrm>
+                <a:off x="4976448" y="2609804"/>
+                <a:ext cx="1043923" cy="523220"/>
+              </a:xfrm>
+              <a:prstGeom prst="rect">
+                <a:avLst/>
+              </a:prstGeom>
+              <a:solidFill>
+                <a:schemeClr val="bg1"/>
               </a:solidFill>
-            </a:ln>
-          </p:spPr>
-          <p:style>
-            <a:lnRef idx="2">
-              <a:schemeClr val="accent1">
-                <a:shade val="50000"/>
-              </a:schemeClr>
-            </a:lnRef>
-            <a:fillRef idx="1">
-              <a:schemeClr val="accent1"/>
-            </a:fillRef>
-            <a:effectRef idx="0">
-              <a:schemeClr val="accent1"/>
-            </a:effectRef>
-            <a:fontRef idx="minor">
-              <a:schemeClr val="lt1"/>
-            </a:fontRef>
-          </p:style>
-          <p:txBody>
-            <a:bodyPr rot="0" spcFirstLastPara="0" vertOverflow="overflow" horzOverflow="overflow" vert="horz" wrap="square" lIns="91440" tIns="45720" rIns="91440" bIns="45720" numCol="1" spcCol="0" rtlCol="0" fromWordArt="0" anchor="ctr" anchorCtr="0" forceAA="0" compatLnSpc="1">
-              <a:prstTxWarp prst="textNoShape">
-                <a:avLst/>
-              </a:prstTxWarp>
-              <a:noAutofit/>
-            </a:bodyPr>
-            <a:lstStyle/>
-            <a:p>
-              <a:pPr algn="ctr"/>
-              <a:endParaRPr lang="en-US"/>
-            </a:p>
-          </p:txBody>
-        </p:sp>
-        <p:sp>
-          <p:nvSpPr>
-            <p:cNvPr id="7" name="Flowchart: Data 6"/>
-            <p:cNvSpPr/>
-            <p:nvPr/>
-          </p:nvSpPr>
-          <p:spPr>
-            <a:xfrm>
-              <a:off x="3688577" y="3419059"/>
-              <a:ext cx="1051560" cy="438912"/>
-            </a:xfrm>
-            <a:prstGeom prst="flowChartInputOutput">
-              <a:avLst/>
-            </a:prstGeom>
-            <a:noFill/>
-            <a:ln w="19050">
-              <a:solidFill>
-                <a:schemeClr val="tx1"/>
-              </a:solidFill>
-            </a:ln>
-          </p:spPr>
-          <p:style>
-            <a:lnRef idx="2">
-              <a:schemeClr val="accent1">
-                <a:shade val="50000"/>
-              </a:schemeClr>
-            </a:lnRef>
-            <a:fillRef idx="1">
-              <a:schemeClr val="accent1"/>
-            </a:fillRef>
-            <a:effectRef idx="0">
-              <a:schemeClr val="accent1"/>
-            </a:effectRef>
-            <a:fontRef idx="minor">
-              <a:schemeClr val="lt1"/>
-            </a:fontRef>
-          </p:style>
-          <p:txBody>
-            <a:bodyPr rot="0" spcFirstLastPara="0" vertOverflow="overflow" horzOverflow="overflow" vert="horz" wrap="square" lIns="91440" tIns="45720" rIns="91440" bIns="45720" numCol="1" spcCol="0" rtlCol="0" fromWordArt="0" anchor="ctr" anchorCtr="0" forceAA="0" compatLnSpc="1">
-              <a:prstTxWarp prst="textNoShape">
-                <a:avLst/>
-              </a:prstTxWarp>
-              <a:noAutofit/>
-            </a:bodyPr>
-            <a:lstStyle/>
-            <a:p>
-              <a:pPr algn="ctr"/>
-              <a:endParaRPr lang="en-US"/>
-            </a:p>
-          </p:txBody>
-        </p:sp>
-        <p:sp>
-          <p:nvSpPr>
-            <p:cNvPr id="8" name="Flowchart: Terminator 7"/>
-            <p:cNvSpPr/>
-            <p:nvPr/>
-          </p:nvSpPr>
-          <p:spPr>
-            <a:xfrm>
-              <a:off x="3756399" y="4280274"/>
-              <a:ext cx="914400" cy="361950"/>
-            </a:xfrm>
-            <a:prstGeom prst="flowChartTerminator">
-              <a:avLst/>
-            </a:prstGeom>
-            <a:noFill/>
-            <a:ln w="19050">
-              <a:solidFill>
-                <a:schemeClr val="tx1"/>
-              </a:solidFill>
-            </a:ln>
-          </p:spPr>
-          <p:style>
-            <a:lnRef idx="2">
-              <a:schemeClr val="dk1">
-                <a:shade val="50000"/>
-              </a:schemeClr>
-            </a:lnRef>
-            <a:fillRef idx="1">
-              <a:schemeClr val="dk1"/>
-            </a:fillRef>
-            <a:effectRef idx="0">
-              <a:schemeClr val="dk1"/>
-            </a:effectRef>
-            <a:fontRef idx="minor">
-              <a:schemeClr val="lt1"/>
-            </a:fontRef>
-          </p:style>
-          <p:txBody>
-            <a:bodyPr rot="0" spcFirstLastPara="0" vertOverflow="overflow" horzOverflow="overflow" vert="horz" wrap="square" lIns="91440" tIns="45720" rIns="91440" bIns="45720" numCol="1" spcCol="0" rtlCol="0" fromWordArt="0" anchor="ctr" anchorCtr="0" forceAA="0" compatLnSpc="1">
-              <a:prstTxWarp prst="textNoShape">
-                <a:avLst/>
-              </a:prstTxWarp>
-              <a:noAutofit/>
-            </a:bodyPr>
-            <a:lstStyle/>
-            <a:p>
-              <a:pPr algn="ctr"/>
-              <a:endParaRPr lang="en-US"/>
-            </a:p>
-          </p:txBody>
-        </p:sp>
-        <p:cxnSp>
-          <p:nvCxnSpPr>
-            <p:cNvPr id="10" name="Straight Arrow Connector 9"/>
-            <p:cNvCxnSpPr>
-              <a:stCxn id="5" idx="0"/>
-              <a:endCxn id="3" idx="2"/>
-            </p:cNvCxnSpPr>
-            <p:nvPr/>
-          </p:nvCxnSpPr>
-          <p:spPr>
-            <a:xfrm flipV="1">
-              <a:off x="2316148" y="2209800"/>
-              <a:ext cx="1446227" cy="1091398"/>
-            </a:xfrm>
-            <a:prstGeom prst="straightConnector1">
-              <a:avLst/>
-            </a:prstGeom>
-            <a:ln w="12700">
-              <a:prstDash val="dash"/>
-              <a:headEnd type="triangle"/>
-              <a:tailEnd type="triangle"/>
-            </a:ln>
-          </p:spPr>
-          <p:style>
-            <a:lnRef idx="1">
-              <a:schemeClr val="dk1"/>
-            </a:lnRef>
-            <a:fillRef idx="0">
-              <a:schemeClr val="dk1"/>
-            </a:fillRef>
-            <a:effectRef idx="0">
-              <a:schemeClr val="dk1"/>
-            </a:effectRef>
-            <a:fontRef idx="minor">
-              <a:schemeClr val="tx1"/>
-            </a:fontRef>
-          </p:style>
-        </p:cxnSp>
-        <p:cxnSp>
-          <p:nvCxnSpPr>
-            <p:cNvPr id="34" name="Straight Arrow Connector 33"/>
-            <p:cNvCxnSpPr>
-              <a:stCxn id="3" idx="6"/>
-              <a:endCxn id="25" idx="0"/>
-            </p:cNvCxnSpPr>
-            <p:nvPr/>
-          </p:nvCxnSpPr>
-          <p:spPr>
-            <a:xfrm>
-              <a:off x="4676775" y="2209800"/>
-              <a:ext cx="1431896" cy="1091398"/>
-            </a:xfrm>
-            <a:prstGeom prst="straightConnector1">
-              <a:avLst/>
-            </a:prstGeom>
-            <a:ln w="12700">
-              <a:prstDash val="dash"/>
-              <a:headEnd type="triangle"/>
-              <a:tailEnd type="triangle"/>
-            </a:ln>
-          </p:spPr>
-          <p:style>
-            <a:lnRef idx="1">
-              <a:schemeClr val="dk1"/>
-            </a:lnRef>
-            <a:fillRef idx="0">
-              <a:schemeClr val="dk1"/>
-            </a:fillRef>
-            <a:effectRef idx="0">
-              <a:schemeClr val="dk1"/>
-            </a:effectRef>
-            <a:fontRef idx="minor">
-              <a:schemeClr val="tx1"/>
-            </a:fontRef>
-          </p:style>
-        </p:cxnSp>
-        <p:sp>
-          <p:nvSpPr>
-            <p:cNvPr id="18" name="TextBox 17"/>
-            <p:cNvSpPr txBox="1"/>
-            <p:nvPr/>
-          </p:nvSpPr>
-          <p:spPr>
-            <a:xfrm>
-              <a:off x="2535985" y="2620212"/>
-              <a:ext cx="1043923" cy="523220"/>
-            </a:xfrm>
-            <a:prstGeom prst="rect">
-              <a:avLst/>
-            </a:prstGeom>
-            <a:solidFill>
-              <a:schemeClr val="bg1"/>
-            </a:solidFill>
-          </p:spPr>
-          <p:txBody>
-            <a:bodyPr wrap="square" rtlCol="0">
-              <a:spAutoFit/>
-            </a:bodyPr>
-            <a:lstStyle/>
-            <a:p>
-              <a:pPr algn="ctr"/>
-              <a:r>
-                <a:rPr lang="en-US" sz="1400" dirty="0">
-                  <a:latin typeface="Garamond" panose="02020404030301010803" pitchFamily="18" charset="0"/>
-                </a:rPr>
-                <a:t>Registration Information</a:t>
-              </a:r>
-            </a:p>
-          </p:txBody>
-        </p:sp>
-        <p:cxnSp>
-          <p:nvCxnSpPr>
-            <p:cNvPr id="20" name="Curved Connector 19"/>
-            <p:cNvCxnSpPr>
-              <a:stCxn id="8" idx="1"/>
-              <a:endCxn id="5" idx="2"/>
-            </p:cNvCxnSpPr>
-            <p:nvPr/>
-          </p:nvCxnSpPr>
-          <p:spPr>
-            <a:xfrm rot="10800000">
-              <a:off x="2316149" y="3986999"/>
-              <a:ext cx="1440251" cy="474251"/>
-            </a:xfrm>
-            <a:prstGeom prst="curvedConnector2">
-              <a:avLst/>
-            </a:prstGeom>
-            <a:ln w="12700">
-              <a:prstDash val="sysDot"/>
-              <a:tailEnd type="triangle"/>
-            </a:ln>
-          </p:spPr>
-          <p:style>
-            <a:lnRef idx="1">
-              <a:schemeClr val="dk1"/>
-            </a:lnRef>
-            <a:fillRef idx="0">
-              <a:schemeClr val="dk1"/>
-            </a:fillRef>
-            <a:effectRef idx="0">
-              <a:schemeClr val="dk1"/>
-            </a:effectRef>
-            <a:fontRef idx="minor">
-              <a:schemeClr val="tx1"/>
-            </a:fontRef>
-          </p:style>
-        </p:cxnSp>
-        <p:cxnSp>
-          <p:nvCxnSpPr>
-            <p:cNvPr id="43" name="Curved Connector 42"/>
-            <p:cNvCxnSpPr>
-              <a:endCxn id="25" idx="2"/>
-            </p:cNvCxnSpPr>
-            <p:nvPr/>
-          </p:nvCxnSpPr>
-          <p:spPr>
-            <a:xfrm flipV="1">
-              <a:off x="4676775" y="3986998"/>
-              <a:ext cx="1431896" cy="480227"/>
-            </a:xfrm>
-            <a:prstGeom prst="curvedConnector2">
-              <a:avLst/>
-            </a:prstGeom>
-            <a:ln w="12700">
-              <a:solidFill>
-                <a:schemeClr val="tx1"/>
-              </a:solidFill>
-              <a:prstDash val="sysDot"/>
-              <a:tailEnd type="triangle"/>
-            </a:ln>
-          </p:spPr>
-          <p:style>
-            <a:lnRef idx="1">
-              <a:schemeClr val="dk1"/>
-            </a:lnRef>
-            <a:fillRef idx="0">
-              <a:schemeClr val="dk1"/>
-            </a:fillRef>
-            <a:effectRef idx="0">
-              <a:schemeClr val="dk1"/>
-            </a:effectRef>
-            <a:fontRef idx="minor">
-              <a:schemeClr val="tx1"/>
-            </a:fontRef>
-          </p:style>
-        </p:cxnSp>
-        <p:sp>
-          <p:nvSpPr>
-            <p:cNvPr id="48" name="TextBox 47"/>
-            <p:cNvSpPr txBox="1"/>
-            <p:nvPr/>
-          </p:nvSpPr>
-          <p:spPr>
-            <a:xfrm>
-              <a:off x="1744647" y="3473647"/>
-              <a:ext cx="1143001" cy="307777"/>
-            </a:xfrm>
-            <a:prstGeom prst="rect">
-              <a:avLst/>
-            </a:prstGeom>
-            <a:noFill/>
-          </p:spPr>
-          <p:txBody>
-            <a:bodyPr wrap="square" rtlCol="0">
-              <a:spAutoFit/>
-            </a:bodyPr>
-            <a:lstStyle/>
-            <a:p>
-              <a:pPr algn="ctr"/>
-              <a:r>
-                <a:rPr lang="en-US" sz="1400" dirty="0">
-                  <a:latin typeface="Garamond" panose="02020404030301010803" pitchFamily="18" charset="0"/>
-                </a:rPr>
-                <a:t>Node A</a:t>
-              </a:r>
-            </a:p>
-          </p:txBody>
-        </p:sp>
-        <p:sp>
-          <p:nvSpPr>
-            <p:cNvPr id="50" name="TextBox 49"/>
-            <p:cNvSpPr txBox="1"/>
-            <p:nvPr/>
-          </p:nvSpPr>
-          <p:spPr>
-            <a:xfrm>
-              <a:off x="1744647" y="3740777"/>
-              <a:ext cx="1143001" cy="246221"/>
-            </a:xfrm>
-            <a:prstGeom prst="rect">
-              <a:avLst/>
-            </a:prstGeom>
-            <a:noFill/>
-          </p:spPr>
-          <p:txBody>
-            <a:bodyPr wrap="square" rtlCol="0">
-              <a:spAutoFit/>
-            </a:bodyPr>
-            <a:lstStyle/>
-            <a:p>
-              <a:pPr algn="ctr"/>
-              <a:r>
-                <a:rPr lang="en-US" sz="1000" dirty="0">
-                  <a:latin typeface="Garamond" panose="02020404030301010803" pitchFamily="18" charset="0"/>
-                </a:rPr>
-                <a:t>Server</a:t>
-              </a:r>
-            </a:p>
-          </p:txBody>
-        </p:sp>
-        <p:sp>
-          <p:nvSpPr>
-            <p:cNvPr id="51" name="TextBox 50"/>
-            <p:cNvSpPr txBox="1"/>
-            <p:nvPr/>
-          </p:nvSpPr>
-          <p:spPr>
-            <a:xfrm>
-              <a:off x="5537170" y="3740777"/>
-              <a:ext cx="1143001" cy="246221"/>
-            </a:xfrm>
-            <a:prstGeom prst="rect">
-              <a:avLst/>
-            </a:prstGeom>
-            <a:noFill/>
-          </p:spPr>
-          <p:txBody>
-            <a:bodyPr wrap="square" rtlCol="0">
-              <a:spAutoFit/>
-            </a:bodyPr>
-            <a:lstStyle/>
-            <a:p>
-              <a:pPr algn="ctr"/>
-              <a:r>
-                <a:rPr lang="en-US" sz="1000" dirty="0">
-                  <a:latin typeface="Garamond" panose="02020404030301010803" pitchFamily="18" charset="0"/>
-                </a:rPr>
-                <a:t>Client</a:t>
-              </a:r>
-            </a:p>
-          </p:txBody>
-        </p:sp>
-        <p:sp>
-          <p:nvSpPr>
-            <p:cNvPr id="55" name="TextBox 54"/>
-            <p:cNvSpPr txBox="1"/>
-            <p:nvPr/>
-          </p:nvSpPr>
-          <p:spPr>
-            <a:xfrm>
-              <a:off x="5537169" y="3473647"/>
-              <a:ext cx="1143001" cy="307777"/>
-            </a:xfrm>
-            <a:prstGeom prst="rect">
-              <a:avLst/>
-            </a:prstGeom>
-            <a:noFill/>
-          </p:spPr>
-          <p:txBody>
-            <a:bodyPr wrap="square" rtlCol="0">
-              <a:spAutoFit/>
-            </a:bodyPr>
-            <a:lstStyle/>
-            <a:p>
-              <a:pPr algn="ctr"/>
-              <a:r>
-                <a:rPr lang="en-US" sz="1400" dirty="0">
-                  <a:latin typeface="Garamond" panose="02020404030301010803" pitchFamily="18" charset="0"/>
-                </a:rPr>
-                <a:t>Node A</a:t>
-              </a:r>
-            </a:p>
-          </p:txBody>
-        </p:sp>
-        <p:sp>
-          <p:nvSpPr>
-            <p:cNvPr id="56" name="TextBox 55"/>
-            <p:cNvSpPr txBox="1"/>
-            <p:nvPr/>
-          </p:nvSpPr>
-          <p:spPr>
-            <a:xfrm>
-              <a:off x="3762375" y="1919300"/>
-              <a:ext cx="914400" cy="523220"/>
-            </a:xfrm>
-            <a:prstGeom prst="rect">
-              <a:avLst/>
-            </a:prstGeom>
-            <a:noFill/>
-          </p:spPr>
-          <p:txBody>
-            <a:bodyPr wrap="square" rtlCol="0">
-              <a:spAutoFit/>
-            </a:bodyPr>
-            <a:lstStyle/>
-            <a:p>
-              <a:pPr algn="ctr"/>
-              <a:r>
-                <a:rPr lang="en-US" sz="1400" dirty="0">
-                  <a:latin typeface="Garamond" panose="02020404030301010803" pitchFamily="18" charset="0"/>
-                </a:rPr>
-                <a:t>ROS Master</a:t>
-              </a:r>
-            </a:p>
-          </p:txBody>
-        </p:sp>
-        <p:sp>
-          <p:nvSpPr>
-            <p:cNvPr id="58" name="TextBox 57"/>
-            <p:cNvSpPr txBox="1"/>
-            <p:nvPr/>
-          </p:nvSpPr>
-          <p:spPr>
-            <a:xfrm>
-              <a:off x="3674230" y="3405313"/>
-              <a:ext cx="1055457" cy="461665"/>
-            </a:xfrm>
-            <a:prstGeom prst="rect">
-              <a:avLst/>
-            </a:prstGeom>
-            <a:noFill/>
-          </p:spPr>
-          <p:txBody>
-            <a:bodyPr wrap="square" rtlCol="0">
-              <a:spAutoFit/>
-            </a:bodyPr>
-            <a:lstStyle/>
-            <a:p>
-              <a:pPr algn="ctr"/>
-              <a:r>
-                <a:rPr lang="en-US" sz="1200" dirty="0">
-                  <a:latin typeface="Garamond" panose="02020404030301010803" pitchFamily="18" charset="0"/>
-                </a:rPr>
-                <a:t>Message Topic</a:t>
-              </a:r>
-            </a:p>
-          </p:txBody>
-        </p:sp>
-        <p:sp>
-          <p:nvSpPr>
-            <p:cNvPr id="59" name="TextBox 58"/>
-            <p:cNvSpPr txBox="1"/>
-            <p:nvPr/>
-          </p:nvSpPr>
-          <p:spPr>
-            <a:xfrm rot="16200000">
-              <a:off x="2433748" y="3522815"/>
-              <a:ext cx="682144" cy="246221"/>
-            </a:xfrm>
-            <a:prstGeom prst="rect">
-              <a:avLst/>
-            </a:prstGeom>
-            <a:noFill/>
-          </p:spPr>
-          <p:txBody>
-            <a:bodyPr wrap="square" rtlCol="0">
-              <a:spAutoFit/>
-            </a:bodyPr>
-            <a:lstStyle/>
-            <a:p>
-              <a:pPr algn="ctr"/>
-              <a:r>
-                <a:rPr lang="en-US" sz="1000" dirty="0">
-                  <a:latin typeface="Garamond" panose="02020404030301010803" pitchFamily="18" charset="0"/>
-                </a:rPr>
-                <a:t>Publisher</a:t>
-              </a:r>
-            </a:p>
-          </p:txBody>
-        </p:sp>
-        <p:sp>
-          <p:nvSpPr>
-            <p:cNvPr id="64" name="TextBox 63"/>
-            <p:cNvSpPr txBox="1"/>
-            <p:nvPr/>
-          </p:nvSpPr>
-          <p:spPr>
-            <a:xfrm rot="16200000">
-              <a:off x="5292724" y="3523264"/>
-              <a:ext cx="714212" cy="246221"/>
-            </a:xfrm>
-            <a:prstGeom prst="rect">
-              <a:avLst/>
-            </a:prstGeom>
-            <a:noFill/>
-          </p:spPr>
-          <p:txBody>
-            <a:bodyPr wrap="square" rtlCol="0">
-              <a:spAutoFit/>
-            </a:bodyPr>
-            <a:lstStyle/>
-            <a:p>
-              <a:pPr algn="ctr"/>
-              <a:r>
-                <a:rPr lang="en-US" sz="1000" dirty="0">
-                  <a:latin typeface="Garamond" panose="02020404030301010803" pitchFamily="18" charset="0"/>
-                </a:rPr>
-                <a:t>Subscriber</a:t>
-              </a:r>
-            </a:p>
-          </p:txBody>
-        </p:sp>
-        <p:sp>
-          <p:nvSpPr>
-            <p:cNvPr id="68" name="TextBox 67"/>
-            <p:cNvSpPr txBox="1"/>
-            <p:nvPr/>
-          </p:nvSpPr>
-          <p:spPr>
-            <a:xfrm>
-              <a:off x="3722615" y="4329063"/>
-              <a:ext cx="984927" cy="276999"/>
-            </a:xfrm>
-            <a:prstGeom prst="rect">
-              <a:avLst/>
-            </a:prstGeom>
-            <a:noFill/>
-          </p:spPr>
-          <p:txBody>
-            <a:bodyPr wrap="square" rtlCol="0">
-              <a:spAutoFit/>
-            </a:bodyPr>
-            <a:lstStyle/>
-            <a:p>
-              <a:pPr algn="ctr"/>
-              <a:r>
-                <a:rPr lang="en-US" sz="1200" dirty="0">
-                  <a:latin typeface="Garamond" panose="02020404030301010803" pitchFamily="18" charset="0"/>
-                </a:rPr>
-                <a:t>Service Topic</a:t>
-              </a:r>
-            </a:p>
-          </p:txBody>
-        </p:sp>
-        <p:sp>
-          <p:nvSpPr>
-            <p:cNvPr id="69" name="TextBox 68"/>
-            <p:cNvSpPr txBox="1"/>
-            <p:nvPr/>
-          </p:nvSpPr>
-          <p:spPr>
-            <a:xfrm>
-              <a:off x="2661948" y="4238936"/>
-              <a:ext cx="625112" cy="246221"/>
-            </a:xfrm>
-            <a:prstGeom prst="rect">
-              <a:avLst/>
-            </a:prstGeom>
-            <a:solidFill>
-              <a:schemeClr val="bg1"/>
-            </a:solidFill>
-          </p:spPr>
-          <p:txBody>
-            <a:bodyPr wrap="square" rtlCol="0">
-              <a:spAutoFit/>
-            </a:bodyPr>
-            <a:lstStyle/>
-            <a:p>
-              <a:pPr algn="ctr"/>
-              <a:r>
-                <a:rPr lang="en-US" sz="1000" dirty="0">
-                  <a:latin typeface="Garamond" panose="02020404030301010803" pitchFamily="18" charset="0"/>
-                </a:rPr>
-                <a:t>Request</a:t>
-              </a:r>
-            </a:p>
-          </p:txBody>
-        </p:sp>
-        <p:sp>
-          <p:nvSpPr>
-            <p:cNvPr id="72" name="TextBox 71"/>
-            <p:cNvSpPr txBox="1"/>
-            <p:nvPr/>
-          </p:nvSpPr>
-          <p:spPr>
-            <a:xfrm>
-              <a:off x="5183952" y="4253203"/>
-              <a:ext cx="485799" cy="246221"/>
-            </a:xfrm>
-            <a:prstGeom prst="rect">
-              <a:avLst/>
-            </a:prstGeom>
-            <a:solidFill>
-              <a:schemeClr val="bg1"/>
-            </a:solidFill>
-          </p:spPr>
-          <p:txBody>
-            <a:bodyPr wrap="square" rtlCol="0">
-              <a:spAutoFit/>
-            </a:bodyPr>
-            <a:lstStyle/>
-            <a:p>
-              <a:pPr algn="ctr"/>
-              <a:r>
-                <a:rPr lang="en-US" sz="1000" dirty="0">
-                  <a:latin typeface="Garamond" panose="02020404030301010803" pitchFamily="18" charset="0"/>
-                </a:rPr>
-                <a:t>Reply</a:t>
-              </a:r>
-            </a:p>
-          </p:txBody>
-        </p:sp>
-        <p:cxnSp>
-          <p:nvCxnSpPr>
-            <p:cNvPr id="28" name="Straight Connector 27"/>
-            <p:cNvCxnSpPr>
-              <a:stCxn id="59" idx="2"/>
-              <a:endCxn id="58" idx="1"/>
-            </p:cNvCxnSpPr>
-            <p:nvPr/>
-          </p:nvCxnSpPr>
-          <p:spPr>
-            <a:xfrm flipV="1">
-              <a:off x="2897931" y="3636146"/>
-              <a:ext cx="776299" cy="9780"/>
-            </a:xfrm>
-            <a:prstGeom prst="line">
-              <a:avLst/>
-            </a:prstGeom>
-            <a:ln w="12700"/>
-          </p:spPr>
-          <p:style>
-            <a:lnRef idx="1">
-              <a:schemeClr val="dk1"/>
-            </a:lnRef>
-            <a:fillRef idx="0">
-              <a:schemeClr val="dk1"/>
-            </a:fillRef>
-            <a:effectRef idx="0">
-              <a:schemeClr val="dk1"/>
-            </a:effectRef>
-            <a:fontRef idx="minor">
-              <a:schemeClr val="tx1"/>
-            </a:fontRef>
-          </p:style>
-        </p:cxnSp>
-        <p:cxnSp>
-          <p:nvCxnSpPr>
-            <p:cNvPr id="33" name="Straight Arrow Connector 32"/>
-            <p:cNvCxnSpPr>
-              <a:stCxn id="58" idx="3"/>
-              <a:endCxn id="64" idx="0"/>
-            </p:cNvCxnSpPr>
-            <p:nvPr/>
-          </p:nvCxnSpPr>
-          <p:spPr>
-            <a:xfrm>
-              <a:off x="4729687" y="3636146"/>
-              <a:ext cx="797033" cy="10229"/>
-            </a:xfrm>
-            <a:prstGeom prst="straightConnector1">
-              <a:avLst/>
-            </a:prstGeom>
-            <a:ln w="12700">
-              <a:tailEnd type="triangle"/>
-            </a:ln>
-          </p:spPr>
-          <p:style>
-            <a:lnRef idx="1">
-              <a:schemeClr val="dk1"/>
-            </a:lnRef>
-            <a:fillRef idx="0">
-              <a:schemeClr val="dk1"/>
-            </a:fillRef>
-            <a:effectRef idx="0">
-              <a:schemeClr val="dk1"/>
-            </a:effectRef>
-            <a:fontRef idx="minor">
-              <a:schemeClr val="tx1"/>
-            </a:fontRef>
-          </p:style>
-        </p:cxnSp>
-        <p:sp>
-          <p:nvSpPr>
-            <p:cNvPr id="73" name="TextBox 72"/>
-            <p:cNvSpPr txBox="1"/>
-            <p:nvPr/>
-          </p:nvSpPr>
-          <p:spPr>
-            <a:xfrm>
-              <a:off x="4976448" y="2609804"/>
-              <a:ext cx="1043923" cy="523220"/>
-            </a:xfrm>
-            <a:prstGeom prst="rect">
-              <a:avLst/>
-            </a:prstGeom>
-            <a:solidFill>
-              <a:schemeClr val="bg1"/>
-            </a:solidFill>
-          </p:spPr>
-          <p:txBody>
-            <a:bodyPr wrap="square" rtlCol="0">
-              <a:spAutoFit/>
-            </a:bodyPr>
-            <a:lstStyle/>
-            <a:p>
-              <a:pPr algn="ctr"/>
-              <a:r>
-                <a:rPr lang="en-US" sz="1400" dirty="0">
-                  <a:latin typeface="Garamond" panose="02020404030301010803" pitchFamily="18" charset="0"/>
-                </a:rPr>
-                <a:t>Registration Information</a:t>
-              </a:r>
-            </a:p>
-          </p:txBody>
-        </p:sp>
+            </p:spPr>
+            <p:txBody>
+              <a:bodyPr wrap="square" rtlCol="0">
+                <a:spAutoFit/>
+              </a:bodyPr>
+              <a:lstStyle/>
+              <a:p>
+                <a:pPr algn="ctr"/>
+                <a:r>
+                  <a:rPr lang="en-US" sz="1400" dirty="0">
+                    <a:latin typeface="Garamond" panose="02020404030301010803" pitchFamily="18" charset="0"/>
+                  </a:rPr>
+                  <a:t>Registration Information</a:t>
+                </a:r>
+              </a:p>
+            </p:txBody>
+          </p:sp>
+        </p:grpSp>
       </p:grpSp>
     </p:spTree>
     <p:extLst>
@@ -9495,9 +9564,6 @@
                       </a:rPr>
                       <a:t>0, 0, 255</a:t>
                     </a:r>
-                    <a:endParaRPr lang="en-US" sz="1600" dirty="0" smtClean="0">
-                      <a:latin typeface="Garamond" panose="02020404030301010803" pitchFamily="18" charset="0"/>
-                    </a:endParaRPr>
                   </a:p>
                 </p:txBody>
               </p:sp>
@@ -9529,9 +9595,6 @@
                       </a:rPr>
                       <a:t>0, 255, 255</a:t>
                     </a:r>
-                    <a:endParaRPr lang="en-US" sz="1600" dirty="0" smtClean="0">
-                      <a:latin typeface="Garamond" panose="02020404030301010803" pitchFamily="18" charset="0"/>
-                    </a:endParaRPr>
                   </a:p>
                 </p:txBody>
               </p:sp>
@@ -9563,9 +9626,6 @@
                       </a:rPr>
                       <a:t>255, 255, 255</a:t>
                     </a:r>
-                    <a:endParaRPr lang="en-US" sz="1600" dirty="0" smtClean="0">
-                      <a:latin typeface="Garamond" panose="02020404030301010803" pitchFamily="18" charset="0"/>
-                    </a:endParaRPr>
                   </a:p>
                 </p:txBody>
               </p:sp>
@@ -9597,9 +9657,6 @@
                       </a:rPr>
                       <a:t>255, 255, 0</a:t>
                     </a:r>
-                    <a:endParaRPr lang="en-US" sz="1600" dirty="0" smtClean="0">
-                      <a:latin typeface="Garamond" panose="02020404030301010803" pitchFamily="18" charset="0"/>
-                    </a:endParaRPr>
                   </a:p>
                 </p:txBody>
               </p:sp>
@@ -9631,9 +9688,6 @@
                       </a:rPr>
                       <a:t>0, 255, 0</a:t>
                     </a:r>
-                    <a:endParaRPr lang="en-US" sz="1600" dirty="0" smtClean="0">
-                      <a:latin typeface="Garamond" panose="02020404030301010803" pitchFamily="18" charset="0"/>
-                    </a:endParaRPr>
                   </a:p>
                 </p:txBody>
               </p:sp>
@@ -9665,9 +9719,6 @@
                       </a:rPr>
                       <a:t>0, 0, 0</a:t>
                     </a:r>
-                    <a:endParaRPr lang="en-US" sz="1600" dirty="0" smtClean="0">
-                      <a:latin typeface="Garamond" panose="02020404030301010803" pitchFamily="18" charset="0"/>
-                    </a:endParaRPr>
                   </a:p>
                 </p:txBody>
               </p:sp>
@@ -9699,9 +9750,6 @@
                       </a:rPr>
                       <a:t>255, 0, 255</a:t>
                     </a:r>
-                    <a:endParaRPr lang="en-US" sz="1600" dirty="0" smtClean="0">
-                      <a:latin typeface="Garamond" panose="02020404030301010803" pitchFamily="18" charset="0"/>
-                    </a:endParaRPr>
                   </a:p>
                 </p:txBody>
               </p:sp>
@@ -9733,9 +9781,6 @@
                       </a:rPr>
                       <a:t>255, 0, 0</a:t>
                     </a:r>
-                    <a:endParaRPr lang="en-US" sz="1600" dirty="0" smtClean="0">
-                      <a:latin typeface="Garamond" panose="02020404030301010803" pitchFamily="18" charset="0"/>
-                    </a:endParaRPr>
                   </a:p>
                 </p:txBody>
               </p:sp>
@@ -10821,9 +10866,6 @@
                 </a:rPr>
                 <a:t>0, 0, 255</a:t>
               </a:r>
-              <a:endParaRPr lang="en-US" sz="1600" dirty="0" smtClean="0">
-                <a:latin typeface="Garamond" panose="02020404030301010803" pitchFamily="18" charset="0"/>
-              </a:endParaRPr>
             </a:p>
           </p:txBody>
         </p:sp>
@@ -10855,9 +10897,6 @@
                 </a:rPr>
                 <a:t>0, 255, 255</a:t>
               </a:r>
-              <a:endParaRPr lang="en-US" sz="1600" dirty="0" smtClean="0">
-                <a:latin typeface="Garamond" panose="02020404030301010803" pitchFamily="18" charset="0"/>
-              </a:endParaRPr>
             </a:p>
           </p:txBody>
         </p:sp>
@@ -10889,9 +10928,6 @@
                 </a:rPr>
                 <a:t>255, 255, 255</a:t>
               </a:r>
-              <a:endParaRPr lang="en-US" sz="1600" dirty="0" smtClean="0">
-                <a:latin typeface="Garamond" panose="02020404030301010803" pitchFamily="18" charset="0"/>
-              </a:endParaRPr>
             </a:p>
           </p:txBody>
         </p:sp>
@@ -10923,9 +10959,6 @@
                 </a:rPr>
                 <a:t>255, 255, 0</a:t>
               </a:r>
-              <a:endParaRPr lang="en-US" sz="1600" dirty="0" smtClean="0">
-                <a:latin typeface="Garamond" panose="02020404030301010803" pitchFamily="18" charset="0"/>
-              </a:endParaRPr>
             </a:p>
           </p:txBody>
         </p:sp>
@@ -10957,9 +10990,6 @@
                 </a:rPr>
                 <a:t>0, 255, 0</a:t>
               </a:r>
-              <a:endParaRPr lang="en-US" sz="1600" dirty="0" smtClean="0">
-                <a:latin typeface="Garamond" panose="02020404030301010803" pitchFamily="18" charset="0"/>
-              </a:endParaRPr>
             </a:p>
           </p:txBody>
         </p:sp>
@@ -10991,9 +11021,6 @@
                 </a:rPr>
                 <a:t>0, 0, 0</a:t>
               </a:r>
-              <a:endParaRPr lang="en-US" sz="1600" dirty="0" smtClean="0">
-                <a:latin typeface="Garamond" panose="02020404030301010803" pitchFamily="18" charset="0"/>
-              </a:endParaRPr>
             </a:p>
           </p:txBody>
         </p:sp>
@@ -11025,9 +11052,6 @@
                 </a:rPr>
                 <a:t>255, 0, 255</a:t>
               </a:r>
-              <a:endParaRPr lang="en-US" sz="1600" dirty="0" smtClean="0">
-                <a:latin typeface="Garamond" panose="02020404030301010803" pitchFamily="18" charset="0"/>
-              </a:endParaRPr>
             </a:p>
           </p:txBody>
         </p:sp>
@@ -11059,9 +11083,6 @@
                 </a:rPr>
                 <a:t>255, 0, 0</a:t>
               </a:r>
-              <a:endParaRPr lang="en-US" sz="1600" dirty="0" smtClean="0">
-                <a:latin typeface="Garamond" panose="02020404030301010803" pitchFamily="18" charset="0"/>
-              </a:endParaRPr>
             </a:p>
           </p:txBody>
         </p:sp>
@@ -11103,10 +11124,2514 @@
           <a:chExt cx="0" cy="0"/>
         </a:xfrm>
       </p:grpSpPr>
+      <p:grpSp>
+        <p:nvGrpSpPr>
+          <p:cNvPr id="14" name="Group 13"/>
+          <p:cNvGrpSpPr/>
+          <p:nvPr/>
+        </p:nvGrpSpPr>
+        <p:grpSpPr>
+          <a:xfrm>
+            <a:off x="4691742" y="198300"/>
+            <a:ext cx="5746552" cy="5435758"/>
+            <a:chOff x="4691742" y="198300"/>
+            <a:chExt cx="5746552" cy="5435758"/>
+          </a:xfrm>
+        </p:grpSpPr>
+        <p:pic>
+          <p:nvPicPr>
+            <p:cNvPr id="2" name="Picture 1"/>
+            <p:cNvPicPr>
+              <a:picLocks noChangeAspect="1"/>
+            </p:cNvPicPr>
+            <p:nvPr/>
+          </p:nvPicPr>
+          <p:blipFill>
+            <a:blip r:embed="rId2">
+              <a:extLst>
+                <a:ext uri="{28A0092B-C50C-407E-A947-70E740481C1C}">
+                  <a14:useLocalDpi xmlns:a14="http://schemas.microsoft.com/office/drawing/2010/main" val="0"/>
+                </a:ext>
+              </a:extLst>
+            </a:blip>
+            <a:stretch>
+              <a:fillRect/>
+            </a:stretch>
+          </p:blipFill>
+          <p:spPr>
+            <a:xfrm>
+              <a:off x="7043057" y="537482"/>
+              <a:ext cx="1066800" cy="1428750"/>
+            </a:xfrm>
+            <a:prstGeom prst="rect">
+              <a:avLst/>
+            </a:prstGeom>
+          </p:spPr>
+        </p:pic>
+        <p:sp>
+          <p:nvSpPr>
+            <p:cNvPr id="7" name="TextBox 6"/>
+            <p:cNvSpPr txBox="1"/>
+            <p:nvPr/>
+          </p:nvSpPr>
+          <p:spPr>
+            <a:xfrm>
+              <a:off x="7043057" y="198300"/>
+              <a:ext cx="1043923" cy="339182"/>
+            </a:xfrm>
+            <a:prstGeom prst="rect">
+              <a:avLst/>
+            </a:prstGeom>
+            <a:noFill/>
+          </p:spPr>
+          <p:txBody>
+            <a:bodyPr wrap="square" rtlCol="0">
+              <a:spAutoFit/>
+            </a:bodyPr>
+            <a:lstStyle/>
+            <a:p>
+              <a:pPr algn="ctr"/>
+              <a:r>
+                <a:rPr lang="en-US" sz="1600" b="1" dirty="0" smtClean="0">
+                  <a:latin typeface="Garamond" panose="02020404030301010803" pitchFamily="18" charset="0"/>
+                </a:rPr>
+                <a:t>Original</a:t>
+              </a:r>
+              <a:endParaRPr lang="en-US" sz="1600" b="1" dirty="0">
+                <a:latin typeface="Garamond" panose="02020404030301010803" pitchFamily="18" charset="0"/>
+              </a:endParaRPr>
+            </a:p>
+          </p:txBody>
+        </p:sp>
+        <p:grpSp>
+          <p:nvGrpSpPr>
+            <p:cNvPr id="12" name="Group 11"/>
+            <p:cNvGrpSpPr/>
+            <p:nvPr/>
+          </p:nvGrpSpPr>
+          <p:grpSpPr>
+            <a:xfrm>
+              <a:off x="5453189" y="1985019"/>
+              <a:ext cx="4223657" cy="1774237"/>
+              <a:chOff x="5464628" y="2140538"/>
+              <a:chExt cx="4223657" cy="1774237"/>
+            </a:xfrm>
+          </p:grpSpPr>
+          <p:pic>
+            <p:nvPicPr>
+              <p:cNvPr id="3" name="Picture 2"/>
+              <p:cNvPicPr>
+                <a:picLocks noChangeAspect="1"/>
+              </p:cNvPicPr>
+              <p:nvPr/>
+            </p:nvPicPr>
+            <p:blipFill>
+              <a:blip r:embed="rId3">
+                <a:extLst>
+                  <a:ext uri="{28A0092B-C50C-407E-A947-70E740481C1C}">
+                    <a14:useLocalDpi xmlns:a14="http://schemas.microsoft.com/office/drawing/2010/main" val="0"/>
+                  </a:ext>
+                </a:extLst>
+              </a:blip>
+              <a:stretch>
+                <a:fillRect/>
+              </a:stretch>
+            </p:blipFill>
+            <p:spPr>
+              <a:xfrm>
+                <a:off x="5464628" y="2486025"/>
+                <a:ext cx="1066800" cy="1428750"/>
+              </a:xfrm>
+              <a:prstGeom prst="rect">
+                <a:avLst/>
+              </a:prstGeom>
+            </p:spPr>
+          </p:pic>
+          <p:pic>
+            <p:nvPicPr>
+              <p:cNvPr id="4" name="Picture 3"/>
+              <p:cNvPicPr>
+                <a:picLocks noChangeAspect="1"/>
+              </p:cNvPicPr>
+              <p:nvPr/>
+            </p:nvPicPr>
+            <p:blipFill>
+              <a:blip r:embed="rId4">
+                <a:extLst>
+                  <a:ext uri="{28A0092B-C50C-407E-A947-70E740481C1C}">
+                    <a14:useLocalDpi xmlns:a14="http://schemas.microsoft.com/office/drawing/2010/main" val="0"/>
+                  </a:ext>
+                </a:extLst>
+              </a:blip>
+              <a:stretch>
+                <a:fillRect/>
+              </a:stretch>
+            </p:blipFill>
+            <p:spPr>
+              <a:xfrm>
+                <a:off x="8621485" y="2486025"/>
+                <a:ext cx="1066800" cy="1428750"/>
+              </a:xfrm>
+              <a:prstGeom prst="rect">
+                <a:avLst/>
+              </a:prstGeom>
+            </p:spPr>
+          </p:pic>
+          <p:sp>
+            <p:nvSpPr>
+              <p:cNvPr id="8" name="TextBox 7"/>
+              <p:cNvSpPr txBox="1"/>
+              <p:nvPr/>
+            </p:nvSpPr>
+            <p:spPr>
+              <a:xfrm>
+                <a:off x="5487505" y="2140538"/>
+                <a:ext cx="1043923" cy="339182"/>
+              </a:xfrm>
+              <a:prstGeom prst="rect">
+                <a:avLst/>
+              </a:prstGeom>
+              <a:noFill/>
+            </p:spPr>
+            <p:txBody>
+              <a:bodyPr wrap="square" rtlCol="0">
+                <a:spAutoFit/>
+              </a:bodyPr>
+              <a:lstStyle/>
+              <a:p>
+                <a:pPr algn="ctr"/>
+                <a:r>
+                  <a:rPr lang="en-US" sz="1600" b="1" dirty="0" smtClean="0">
+                    <a:latin typeface="Garamond" panose="02020404030301010803" pitchFamily="18" charset="0"/>
+                  </a:rPr>
+                  <a:t>Erosion</a:t>
+                </a:r>
+                <a:endParaRPr lang="en-US" sz="1600" b="1" dirty="0">
+                  <a:latin typeface="Garamond" panose="02020404030301010803" pitchFamily="18" charset="0"/>
+                </a:endParaRPr>
+              </a:p>
+            </p:txBody>
+          </p:sp>
+          <p:sp>
+            <p:nvSpPr>
+              <p:cNvPr id="9" name="TextBox 8"/>
+              <p:cNvSpPr txBox="1"/>
+              <p:nvPr/>
+            </p:nvSpPr>
+            <p:spPr>
+              <a:xfrm>
+                <a:off x="8621485" y="2140538"/>
+                <a:ext cx="1043923" cy="339182"/>
+              </a:xfrm>
+              <a:prstGeom prst="rect">
+                <a:avLst/>
+              </a:prstGeom>
+              <a:noFill/>
+            </p:spPr>
+            <p:txBody>
+              <a:bodyPr wrap="square" rtlCol="0">
+                <a:spAutoFit/>
+              </a:bodyPr>
+              <a:lstStyle/>
+              <a:p>
+                <a:pPr algn="ctr"/>
+                <a:r>
+                  <a:rPr lang="en-US" sz="1600" b="1" dirty="0" smtClean="0">
+                    <a:latin typeface="Garamond" panose="02020404030301010803" pitchFamily="18" charset="0"/>
+                  </a:rPr>
+                  <a:t>Dilation</a:t>
+                </a:r>
+                <a:endParaRPr lang="en-US" sz="1600" b="1" dirty="0">
+                  <a:latin typeface="Garamond" panose="02020404030301010803" pitchFamily="18" charset="0"/>
+                </a:endParaRPr>
+              </a:p>
+            </p:txBody>
+          </p:sp>
+        </p:grpSp>
+        <p:grpSp>
+          <p:nvGrpSpPr>
+            <p:cNvPr id="13" name="Group 12"/>
+            <p:cNvGrpSpPr/>
+            <p:nvPr/>
+          </p:nvGrpSpPr>
+          <p:grpSpPr>
+            <a:xfrm>
+              <a:off x="4691742" y="3847967"/>
+              <a:ext cx="5746552" cy="1786091"/>
+              <a:chOff x="4667525" y="4382027"/>
+              <a:chExt cx="5746552" cy="1786091"/>
+            </a:xfrm>
+          </p:grpSpPr>
+          <p:pic>
+            <p:nvPicPr>
+              <p:cNvPr id="5" name="Picture 4"/>
+              <p:cNvPicPr>
+                <a:picLocks noChangeAspect="1"/>
+              </p:cNvPicPr>
+              <p:nvPr/>
+            </p:nvPicPr>
+            <p:blipFill>
+              <a:blip r:embed="rId5">
+                <a:extLst>
+                  <a:ext uri="{28A0092B-C50C-407E-A947-70E740481C1C}">
+                    <a14:useLocalDpi xmlns:a14="http://schemas.microsoft.com/office/drawing/2010/main" val="0"/>
+                  </a:ext>
+                </a:extLst>
+              </a:blip>
+              <a:stretch>
+                <a:fillRect/>
+              </a:stretch>
+            </p:blipFill>
+            <p:spPr>
+              <a:xfrm>
+                <a:off x="4931228" y="4739368"/>
+                <a:ext cx="2133600" cy="1428750"/>
+              </a:xfrm>
+              <a:prstGeom prst="rect">
+                <a:avLst/>
+              </a:prstGeom>
+            </p:spPr>
+          </p:pic>
+          <p:pic>
+            <p:nvPicPr>
+              <p:cNvPr id="6" name="Picture 5"/>
+              <p:cNvPicPr>
+                <a:picLocks noChangeAspect="1"/>
+              </p:cNvPicPr>
+              <p:nvPr/>
+            </p:nvPicPr>
+            <p:blipFill>
+              <a:blip r:embed="rId6">
+                <a:extLst>
+                  <a:ext uri="{28A0092B-C50C-407E-A947-70E740481C1C}">
+                    <a14:useLocalDpi xmlns:a14="http://schemas.microsoft.com/office/drawing/2010/main" val="0"/>
+                  </a:ext>
+                </a:extLst>
+              </a:blip>
+              <a:stretch>
+                <a:fillRect/>
+              </a:stretch>
+            </p:blipFill>
+            <p:spPr>
+              <a:xfrm>
+                <a:off x="8088085" y="4739368"/>
+                <a:ext cx="2133600" cy="1428750"/>
+              </a:xfrm>
+              <a:prstGeom prst="rect">
+                <a:avLst/>
+              </a:prstGeom>
+            </p:spPr>
+          </p:pic>
+          <p:sp>
+            <p:nvSpPr>
+              <p:cNvPr id="10" name="TextBox 9"/>
+              <p:cNvSpPr txBox="1"/>
+              <p:nvPr/>
+            </p:nvSpPr>
+            <p:spPr>
+              <a:xfrm>
+                <a:off x="4667525" y="4382027"/>
+                <a:ext cx="2661005" cy="338554"/>
+              </a:xfrm>
+              <a:prstGeom prst="rect">
+                <a:avLst/>
+              </a:prstGeom>
+              <a:noFill/>
+            </p:spPr>
+            <p:txBody>
+              <a:bodyPr wrap="square" rtlCol="0">
+                <a:spAutoFit/>
+              </a:bodyPr>
+              <a:lstStyle/>
+              <a:p>
+                <a:pPr algn="ctr"/>
+                <a:r>
+                  <a:rPr lang="en-US" sz="1600" b="1" dirty="0" smtClean="0">
+                    <a:latin typeface="Garamond" panose="02020404030301010803" pitchFamily="18" charset="0"/>
+                  </a:rPr>
+                  <a:t>Opening (Erosion/Dilation)</a:t>
+                </a:r>
+                <a:endParaRPr lang="en-US" sz="1600" b="1" dirty="0">
+                  <a:latin typeface="Garamond" panose="02020404030301010803" pitchFamily="18" charset="0"/>
+                </a:endParaRPr>
+              </a:p>
+            </p:txBody>
+          </p:sp>
+          <p:sp>
+            <p:nvSpPr>
+              <p:cNvPr id="11" name="TextBox 10"/>
+              <p:cNvSpPr txBox="1"/>
+              <p:nvPr/>
+            </p:nvSpPr>
+            <p:spPr>
+              <a:xfrm>
+                <a:off x="7872814" y="4389928"/>
+                <a:ext cx="2541263" cy="338554"/>
+              </a:xfrm>
+              <a:prstGeom prst="rect">
+                <a:avLst/>
+              </a:prstGeom>
+              <a:noFill/>
+            </p:spPr>
+            <p:txBody>
+              <a:bodyPr wrap="square" rtlCol="0">
+                <a:spAutoFit/>
+              </a:bodyPr>
+              <a:lstStyle/>
+              <a:p>
+                <a:pPr algn="ctr"/>
+                <a:r>
+                  <a:rPr lang="en-US" sz="1600" b="1" dirty="0" smtClean="0">
+                    <a:latin typeface="Garamond" panose="02020404030301010803" pitchFamily="18" charset="0"/>
+                  </a:rPr>
+                  <a:t>Closing (Dilation/Erosion)</a:t>
+                </a:r>
+                <a:endParaRPr lang="en-US" sz="1600" b="1" dirty="0">
+                  <a:latin typeface="Garamond" panose="02020404030301010803" pitchFamily="18" charset="0"/>
+                </a:endParaRPr>
+              </a:p>
+            </p:txBody>
+          </p:sp>
+        </p:grpSp>
+      </p:grpSp>
     </p:spTree>
     <p:extLst>
       <p:ext uri="{BB962C8B-B14F-4D97-AF65-F5344CB8AC3E}">
         <p14:creationId xmlns:p14="http://schemas.microsoft.com/office/powerpoint/2010/main" val="2130355561"/>
+      </p:ext>
+    </p:extLst>
+  </p:cSld>
+  <p:clrMapOvr>
+    <a:masterClrMapping/>
+  </p:clrMapOvr>
+  <p:timing>
+    <p:tnLst>
+      <p:par>
+        <p:cTn id="1" dur="indefinite" restart="never" nodeType="tmRoot"/>
+      </p:par>
+    </p:tnLst>
+  </p:timing>
+</p:sld>
+</file>
+
+<file path=ppt/slides/slide6.xml><?xml version="1.0" encoding="utf-8"?>
+<p:sld xmlns:a="http://schemas.openxmlformats.org/drawingml/2006/main" xmlns:r="http://schemas.openxmlformats.org/officeDocument/2006/relationships" xmlns:p="http://schemas.openxmlformats.org/presentationml/2006/main">
+  <p:cSld>
+    <p:spTree>
+      <p:nvGrpSpPr>
+        <p:cNvPr id="1" name=""/>
+        <p:cNvGrpSpPr/>
+        <p:nvPr/>
+      </p:nvGrpSpPr>
+      <p:grpSpPr>
+        <a:xfrm>
+          <a:off x="0" y="0"/>
+          <a:ext cx="0" cy="0"/>
+          <a:chOff x="0" y="0"/>
+          <a:chExt cx="0" cy="0"/>
+        </a:xfrm>
+      </p:grpSpPr>
+      <p:sp>
+        <p:nvSpPr>
+          <p:cNvPr id="15" name="Text Box 9"/>
+          <p:cNvSpPr txBox="1">
+            <a:spLocks noChangeArrowheads="1"/>
+          </p:cNvSpPr>
+          <p:nvPr/>
+        </p:nvSpPr>
+        <p:spPr bwMode="auto">
+          <a:xfrm>
+            <a:off x="666971" y="4769462"/>
+            <a:ext cx="2286000" cy="366712"/>
+          </a:xfrm>
+          <a:prstGeom prst="rect">
+            <a:avLst/>
+          </a:prstGeom>
+          <a:noFill/>
+          <a:ln w="9525">
+            <a:noFill/>
+            <a:miter lim="800000"/>
+            <a:headEnd/>
+            <a:tailEnd/>
+          </a:ln>
+          <a:effectLst/>
+        </p:spPr>
+        <p:txBody>
+          <a:bodyPr>
+            <a:spAutoFit/>
+          </a:bodyPr>
+          <a:lstStyle/>
+          <a:p>
+            <a:pPr algn="l" rtl="0" eaLnBrk="0" fontAlgn="base" hangingPunct="0">
+              <a:spcBef>
+                <a:spcPct val="50000"/>
+              </a:spcBef>
+              <a:spcAft>
+                <a:spcPct val="0"/>
+              </a:spcAft>
+            </a:pPr>
+            <a:r>
+              <a:rPr lang="en-US" kern="1200" dirty="0">
+                <a:solidFill>
+                  <a:srgbClr val="000000"/>
+                </a:solidFill>
+                <a:latin typeface="Arial" charset="0"/>
+                <a:ea typeface="+mn-ea"/>
+                <a:cs typeface="+mn-cs"/>
+              </a:rPr>
+              <a:t>Image space</a:t>
+            </a:r>
+          </a:p>
+        </p:txBody>
+      </p:sp>
+      <p:pic>
+        <p:nvPicPr>
+          <p:cNvPr id="16" name="Picture 15" descr="img007"/>
+          <p:cNvPicPr>
+            <a:picLocks noChangeAspect="1" noChangeArrowheads="1"/>
+          </p:cNvPicPr>
+          <p:nvPr/>
+        </p:nvPicPr>
+        <p:blipFill>
+          <a:blip r:embed="rId2" cstate="print"/>
+          <a:srcRect r="52785"/>
+          <a:stretch>
+            <a:fillRect/>
+          </a:stretch>
+        </p:blipFill>
+        <p:spPr bwMode="auto">
+          <a:xfrm>
+            <a:off x="-87198" y="1764366"/>
+            <a:ext cx="3728983" cy="3086100"/>
+          </a:xfrm>
+          <a:prstGeom prst="rect">
+            <a:avLst/>
+          </a:prstGeom>
+          <a:noFill/>
+          <a:ln w="9525">
+            <a:noFill/>
+            <a:miter lim="800000"/>
+            <a:headEnd/>
+            <a:tailEnd/>
+          </a:ln>
+        </p:spPr>
+      </p:pic>
+      <p:sp>
+        <p:nvSpPr>
+          <p:cNvPr id="17" name="Text Box 8"/>
+          <p:cNvSpPr txBox="1">
+            <a:spLocks noChangeArrowheads="1"/>
+          </p:cNvSpPr>
+          <p:nvPr/>
+        </p:nvSpPr>
+        <p:spPr bwMode="auto">
+          <a:xfrm>
+            <a:off x="5134161" y="4740927"/>
+            <a:ext cx="2286000" cy="366713"/>
+          </a:xfrm>
+          <a:prstGeom prst="rect">
+            <a:avLst/>
+          </a:prstGeom>
+          <a:noFill/>
+          <a:ln w="9525">
+            <a:noFill/>
+            <a:miter lim="800000"/>
+            <a:headEnd/>
+            <a:tailEnd/>
+          </a:ln>
+          <a:effectLst/>
+        </p:spPr>
+        <p:txBody>
+          <a:bodyPr>
+            <a:spAutoFit/>
+          </a:bodyPr>
+          <a:lstStyle/>
+          <a:p>
+            <a:pPr algn="l" rtl="0" eaLnBrk="0" fontAlgn="base" hangingPunct="0">
+              <a:spcBef>
+                <a:spcPct val="50000"/>
+              </a:spcBef>
+              <a:spcAft>
+                <a:spcPct val="0"/>
+              </a:spcAft>
+            </a:pPr>
+            <a:r>
+              <a:rPr lang="en-US" kern="1200" dirty="0">
+                <a:solidFill>
+                  <a:srgbClr val="000000"/>
+                </a:solidFill>
+                <a:latin typeface="Arial" charset="0"/>
+                <a:ea typeface="+mn-ea"/>
+                <a:cs typeface="+mn-cs"/>
+              </a:rPr>
+              <a:t>Hough space</a:t>
+            </a:r>
+          </a:p>
+        </p:txBody>
+      </p:sp>
+      <p:pic>
+        <p:nvPicPr>
+          <p:cNvPr id="18" name="Picture 17" descr="img007"/>
+          <p:cNvPicPr>
+            <a:picLocks noChangeAspect="1" noChangeArrowheads="1"/>
+          </p:cNvPicPr>
+          <p:nvPr/>
+        </p:nvPicPr>
+        <p:blipFill>
+          <a:blip r:embed="rId2" cstate="print"/>
+          <a:srcRect l="53306"/>
+          <a:stretch>
+            <a:fillRect/>
+          </a:stretch>
+        </p:blipFill>
+        <p:spPr bwMode="auto">
+          <a:xfrm>
+            <a:off x="3673641" y="1764366"/>
+            <a:ext cx="3687813" cy="3086100"/>
+          </a:xfrm>
+          <a:prstGeom prst="rect">
+            <a:avLst/>
+          </a:prstGeom>
+          <a:noFill/>
+          <a:ln w="9525">
+            <a:noFill/>
+            <a:miter lim="800000"/>
+            <a:headEnd/>
+            <a:tailEnd/>
+          </a:ln>
+        </p:spPr>
+      </p:pic>
+      <p:sp>
+        <p:nvSpPr>
+          <p:cNvPr id="19" name="TextBox 18"/>
+          <p:cNvSpPr txBox="1"/>
+          <p:nvPr/>
+        </p:nvSpPr>
+        <p:spPr>
+          <a:xfrm>
+            <a:off x="6818835" y="3070841"/>
+            <a:ext cx="1623969" cy="1200329"/>
+          </a:xfrm>
+          <a:prstGeom prst="rect">
+            <a:avLst/>
+          </a:prstGeom>
+          <a:noFill/>
+        </p:spPr>
+        <p:txBody>
+          <a:bodyPr wrap="square" rtlCol="0">
+            <a:spAutoFit/>
+          </a:bodyPr>
+          <a:lstStyle/>
+          <a:p>
+            <a:pPr algn="l" rtl="0"/>
+            <a:r>
+              <a:rPr lang="en-US" kern="1200" dirty="0">
+                <a:solidFill>
+                  <a:srgbClr val="000000"/>
+                </a:solidFill>
+                <a:latin typeface="Arial"/>
+                <a:ea typeface="+mn-ea"/>
+                <a:cs typeface="+mn-cs"/>
+              </a:rPr>
+              <a:t>Intersection: most votes for center occur here.</a:t>
+            </a:r>
+          </a:p>
+        </p:txBody>
+      </p:sp>
+      <p:sp>
+        <p:nvSpPr>
+          <p:cNvPr id="41" name="TextBox 40"/>
+          <p:cNvSpPr txBox="1"/>
+          <p:nvPr/>
+        </p:nvSpPr>
+        <p:spPr>
+          <a:xfrm rot="16200000">
+            <a:off x="7739257" y="3299382"/>
+            <a:ext cx="2356589" cy="338554"/>
+          </a:xfrm>
+          <a:prstGeom prst="rect">
+            <a:avLst/>
+          </a:prstGeom>
+          <a:noFill/>
+        </p:spPr>
+        <p:txBody>
+          <a:bodyPr wrap="square" rtlCol="0">
+            <a:spAutoFit/>
+          </a:bodyPr>
+          <a:lstStyle/>
+          <a:p>
+            <a:pPr algn="r"/>
+            <a:r>
+              <a:rPr lang="en-US" sz="1600" dirty="0">
+                <a:latin typeface="Garamond" panose="02020404030301010803" pitchFamily="18" charset="0"/>
+              </a:rPr>
+              <a:t>y</a:t>
+            </a:r>
+          </a:p>
+        </p:txBody>
+      </p:sp>
+      <p:grpSp>
+        <p:nvGrpSpPr>
+          <p:cNvPr id="62" name="Group 61"/>
+          <p:cNvGrpSpPr/>
+          <p:nvPr/>
+        </p:nvGrpSpPr>
+        <p:grpSpPr>
+          <a:xfrm>
+            <a:off x="8971053" y="2268861"/>
+            <a:ext cx="6030111" cy="2893555"/>
+            <a:chOff x="8971053" y="2268861"/>
+            <a:chExt cx="6030111" cy="2893555"/>
+          </a:xfrm>
+        </p:grpSpPr>
+        <p:cxnSp>
+          <p:nvCxnSpPr>
+            <p:cNvPr id="22" name="Straight Arrow Connector 21"/>
+            <p:cNvCxnSpPr/>
+            <p:nvPr/>
+          </p:nvCxnSpPr>
+          <p:spPr>
+            <a:xfrm flipV="1">
+              <a:off x="9082585" y="2285999"/>
+              <a:ext cx="0" cy="2359152"/>
+            </a:xfrm>
+            <a:prstGeom prst="straightConnector1">
+              <a:avLst/>
+            </a:prstGeom>
+            <a:ln w="19050">
+              <a:solidFill>
+                <a:schemeClr val="tx1"/>
+              </a:solidFill>
+              <a:tailEnd type="triangle"/>
+            </a:ln>
+          </p:spPr>
+          <p:style>
+            <a:lnRef idx="1">
+              <a:schemeClr val="dk1"/>
+            </a:lnRef>
+            <a:fillRef idx="0">
+              <a:schemeClr val="dk1"/>
+            </a:fillRef>
+            <a:effectRef idx="0">
+              <a:schemeClr val="dk1"/>
+            </a:effectRef>
+            <a:fontRef idx="minor">
+              <a:schemeClr val="tx1"/>
+            </a:fontRef>
+          </p:style>
+        </p:cxnSp>
+        <p:cxnSp>
+          <p:nvCxnSpPr>
+            <p:cNvPr id="24" name="Straight Arrow Connector 23"/>
+            <p:cNvCxnSpPr/>
+            <p:nvPr/>
+          </p:nvCxnSpPr>
+          <p:spPr>
+            <a:xfrm>
+              <a:off x="9082585" y="4647063"/>
+              <a:ext cx="2361063" cy="0"/>
+            </a:xfrm>
+            <a:prstGeom prst="straightConnector1">
+              <a:avLst/>
+            </a:prstGeom>
+            <a:ln w="19050">
+              <a:solidFill>
+                <a:schemeClr val="tx1"/>
+              </a:solidFill>
+              <a:tailEnd type="triangle"/>
+            </a:ln>
+          </p:spPr>
+          <p:style>
+            <a:lnRef idx="1">
+              <a:schemeClr val="accent1"/>
+            </a:lnRef>
+            <a:fillRef idx="0">
+              <a:schemeClr val="accent1"/>
+            </a:fillRef>
+            <a:effectRef idx="0">
+              <a:schemeClr val="accent1"/>
+            </a:effectRef>
+            <a:fontRef idx="minor">
+              <a:schemeClr val="tx1"/>
+            </a:fontRef>
+          </p:style>
+        </p:cxnSp>
+        <p:cxnSp>
+          <p:nvCxnSpPr>
+            <p:cNvPr id="25" name="Straight Arrow Connector 24"/>
+            <p:cNvCxnSpPr/>
+            <p:nvPr/>
+          </p:nvCxnSpPr>
+          <p:spPr>
+            <a:xfrm flipV="1">
+              <a:off x="12640101" y="2285999"/>
+              <a:ext cx="0" cy="2359152"/>
+            </a:xfrm>
+            <a:prstGeom prst="straightConnector1">
+              <a:avLst/>
+            </a:prstGeom>
+            <a:ln w="19050">
+              <a:solidFill>
+                <a:schemeClr val="tx1"/>
+              </a:solidFill>
+              <a:tailEnd type="triangle"/>
+            </a:ln>
+          </p:spPr>
+          <p:style>
+            <a:lnRef idx="1">
+              <a:schemeClr val="dk1"/>
+            </a:lnRef>
+            <a:fillRef idx="0">
+              <a:schemeClr val="dk1"/>
+            </a:fillRef>
+            <a:effectRef idx="0">
+              <a:schemeClr val="dk1"/>
+            </a:effectRef>
+            <a:fontRef idx="minor">
+              <a:schemeClr val="tx1"/>
+            </a:fontRef>
+          </p:style>
+        </p:cxnSp>
+        <p:cxnSp>
+          <p:nvCxnSpPr>
+            <p:cNvPr id="26" name="Straight Arrow Connector 25"/>
+            <p:cNvCxnSpPr/>
+            <p:nvPr/>
+          </p:nvCxnSpPr>
+          <p:spPr>
+            <a:xfrm>
+              <a:off x="12640101" y="4647063"/>
+              <a:ext cx="2361063" cy="0"/>
+            </a:xfrm>
+            <a:prstGeom prst="straightConnector1">
+              <a:avLst/>
+            </a:prstGeom>
+            <a:ln w="19050">
+              <a:solidFill>
+                <a:schemeClr val="tx1"/>
+              </a:solidFill>
+              <a:tailEnd type="triangle"/>
+            </a:ln>
+          </p:spPr>
+          <p:style>
+            <a:lnRef idx="1">
+              <a:schemeClr val="accent1"/>
+            </a:lnRef>
+            <a:fillRef idx="0">
+              <a:schemeClr val="accent1"/>
+            </a:fillRef>
+            <a:effectRef idx="0">
+              <a:schemeClr val="accent1"/>
+            </a:effectRef>
+            <a:fontRef idx="minor">
+              <a:schemeClr val="tx1"/>
+            </a:fontRef>
+          </p:style>
+        </p:cxnSp>
+        <p:sp>
+          <p:nvSpPr>
+            <p:cNvPr id="27" name="Oval 26"/>
+            <p:cNvSpPr/>
+            <p:nvPr/>
+          </p:nvSpPr>
+          <p:spPr>
+            <a:xfrm>
+              <a:off x="9764063" y="2952419"/>
+              <a:ext cx="1097280" cy="1097280"/>
+            </a:xfrm>
+            <a:prstGeom prst="ellipse">
+              <a:avLst/>
+            </a:prstGeom>
+            <a:noFill/>
+            <a:ln w="19050">
+              <a:solidFill>
+                <a:schemeClr val="tx1"/>
+              </a:solidFill>
+            </a:ln>
+          </p:spPr>
+          <p:style>
+            <a:lnRef idx="2">
+              <a:schemeClr val="accent1">
+                <a:shade val="50000"/>
+              </a:schemeClr>
+            </a:lnRef>
+            <a:fillRef idx="1">
+              <a:schemeClr val="accent1"/>
+            </a:fillRef>
+            <a:effectRef idx="0">
+              <a:schemeClr val="accent1"/>
+            </a:effectRef>
+            <a:fontRef idx="minor">
+              <a:schemeClr val="lt1"/>
+            </a:fontRef>
+          </p:style>
+          <p:txBody>
+            <a:bodyPr rtlCol="0" anchor="ctr"/>
+            <a:lstStyle/>
+            <a:p>
+              <a:pPr algn="ctr"/>
+              <a:endParaRPr lang="en-US"/>
+            </a:p>
+          </p:txBody>
+        </p:sp>
+        <p:sp>
+          <p:nvSpPr>
+            <p:cNvPr id="28" name="Oval 27"/>
+            <p:cNvSpPr/>
+            <p:nvPr/>
+          </p:nvSpPr>
+          <p:spPr>
+            <a:xfrm>
+              <a:off x="12794221" y="2814030"/>
+              <a:ext cx="1097280" cy="1097280"/>
+            </a:xfrm>
+            <a:prstGeom prst="ellipse">
+              <a:avLst/>
+            </a:prstGeom>
+            <a:noFill/>
+            <a:ln w="19050">
+              <a:solidFill>
+                <a:schemeClr val="tx1"/>
+              </a:solidFill>
+              <a:prstDash val="sysDash"/>
+            </a:ln>
+          </p:spPr>
+          <p:style>
+            <a:lnRef idx="2">
+              <a:schemeClr val="accent1">
+                <a:shade val="50000"/>
+              </a:schemeClr>
+            </a:lnRef>
+            <a:fillRef idx="1">
+              <a:schemeClr val="accent1"/>
+            </a:fillRef>
+            <a:effectRef idx="0">
+              <a:schemeClr val="accent1"/>
+            </a:effectRef>
+            <a:fontRef idx="minor">
+              <a:schemeClr val="lt1"/>
+            </a:fontRef>
+          </p:style>
+          <p:txBody>
+            <a:bodyPr rtlCol="0" anchor="ctr"/>
+            <a:lstStyle/>
+            <a:p>
+              <a:pPr algn="ctr"/>
+              <a:endParaRPr lang="en-US"/>
+            </a:p>
+          </p:txBody>
+        </p:sp>
+        <p:sp>
+          <p:nvSpPr>
+            <p:cNvPr id="29" name="Oval 28"/>
+            <p:cNvSpPr/>
+            <p:nvPr/>
+          </p:nvSpPr>
+          <p:spPr>
+            <a:xfrm>
+              <a:off x="13788810" y="2684946"/>
+              <a:ext cx="1097280" cy="1097280"/>
+            </a:xfrm>
+            <a:prstGeom prst="ellipse">
+              <a:avLst/>
+            </a:prstGeom>
+            <a:noFill/>
+            <a:ln w="19050">
+              <a:solidFill>
+                <a:schemeClr val="tx1"/>
+              </a:solidFill>
+              <a:prstDash val="sysDash"/>
+            </a:ln>
+          </p:spPr>
+          <p:style>
+            <a:lnRef idx="2">
+              <a:schemeClr val="accent1">
+                <a:shade val="50000"/>
+              </a:schemeClr>
+            </a:lnRef>
+            <a:fillRef idx="1">
+              <a:schemeClr val="accent1"/>
+            </a:fillRef>
+            <a:effectRef idx="0">
+              <a:schemeClr val="accent1"/>
+            </a:effectRef>
+            <a:fontRef idx="minor">
+              <a:schemeClr val="lt1"/>
+            </a:fontRef>
+          </p:style>
+          <p:txBody>
+            <a:bodyPr rtlCol="0" anchor="ctr"/>
+            <a:lstStyle/>
+            <a:p>
+              <a:pPr algn="ctr"/>
+              <a:endParaRPr lang="en-US"/>
+            </a:p>
+          </p:txBody>
+        </p:sp>
+        <p:sp>
+          <p:nvSpPr>
+            <p:cNvPr id="30" name="Oval 29"/>
+            <p:cNvSpPr/>
+            <p:nvPr/>
+          </p:nvSpPr>
+          <p:spPr>
+            <a:xfrm>
+              <a:off x="13075712" y="3459367"/>
+              <a:ext cx="1097280" cy="1097280"/>
+            </a:xfrm>
+            <a:prstGeom prst="ellipse">
+              <a:avLst/>
+            </a:prstGeom>
+            <a:noFill/>
+            <a:ln w="19050">
+              <a:solidFill>
+                <a:schemeClr val="tx1"/>
+              </a:solidFill>
+              <a:prstDash val="sysDash"/>
+            </a:ln>
+          </p:spPr>
+          <p:style>
+            <a:lnRef idx="2">
+              <a:schemeClr val="accent1">
+                <a:shade val="50000"/>
+              </a:schemeClr>
+            </a:lnRef>
+            <a:fillRef idx="1">
+              <a:schemeClr val="accent1"/>
+            </a:fillRef>
+            <a:effectRef idx="0">
+              <a:schemeClr val="accent1"/>
+            </a:effectRef>
+            <a:fontRef idx="minor">
+              <a:schemeClr val="lt1"/>
+            </a:fontRef>
+          </p:style>
+          <p:txBody>
+            <a:bodyPr rtlCol="0" anchor="ctr"/>
+            <a:lstStyle/>
+            <a:p>
+              <a:pPr algn="ctr"/>
+              <a:endParaRPr lang="en-US"/>
+            </a:p>
+          </p:txBody>
+        </p:sp>
+        <p:sp>
+          <p:nvSpPr>
+            <p:cNvPr id="31" name="Oval 30"/>
+            <p:cNvSpPr/>
+            <p:nvPr/>
+          </p:nvSpPr>
+          <p:spPr>
+            <a:xfrm>
+              <a:off x="13323194" y="3000187"/>
+              <a:ext cx="1097280" cy="1097280"/>
+            </a:xfrm>
+            <a:prstGeom prst="ellipse">
+              <a:avLst/>
+            </a:prstGeom>
+            <a:noFill/>
+            <a:ln w="19050">
+              <a:solidFill>
+                <a:schemeClr val="tx1"/>
+              </a:solidFill>
+            </a:ln>
+          </p:spPr>
+          <p:style>
+            <a:lnRef idx="2">
+              <a:schemeClr val="accent1">
+                <a:shade val="50000"/>
+              </a:schemeClr>
+            </a:lnRef>
+            <a:fillRef idx="1">
+              <a:schemeClr val="accent1"/>
+            </a:fillRef>
+            <a:effectRef idx="0">
+              <a:schemeClr val="accent1"/>
+            </a:effectRef>
+            <a:fontRef idx="minor">
+              <a:schemeClr val="lt1"/>
+            </a:fontRef>
+          </p:style>
+          <p:txBody>
+            <a:bodyPr rtlCol="0" anchor="ctr"/>
+            <a:lstStyle/>
+            <a:p>
+              <a:pPr algn="ctr"/>
+              <a:endParaRPr lang="en-US"/>
+            </a:p>
+          </p:txBody>
+        </p:sp>
+        <p:sp>
+          <p:nvSpPr>
+            <p:cNvPr id="32" name="Oval 31"/>
+            <p:cNvSpPr/>
+            <p:nvPr/>
+          </p:nvSpPr>
+          <p:spPr>
+            <a:xfrm>
+              <a:off x="9725963" y="3298055"/>
+              <a:ext cx="118872" cy="118872"/>
+            </a:xfrm>
+            <a:prstGeom prst="ellipse">
+              <a:avLst/>
+            </a:prstGeom>
+            <a:solidFill>
+              <a:schemeClr val="bg1"/>
+            </a:solidFill>
+            <a:ln w="19050">
+              <a:solidFill>
+                <a:schemeClr val="tx1"/>
+              </a:solidFill>
+            </a:ln>
+          </p:spPr>
+          <p:style>
+            <a:lnRef idx="2">
+              <a:schemeClr val="accent1">
+                <a:shade val="50000"/>
+              </a:schemeClr>
+            </a:lnRef>
+            <a:fillRef idx="1">
+              <a:schemeClr val="accent1"/>
+            </a:fillRef>
+            <a:effectRef idx="0">
+              <a:schemeClr val="accent1"/>
+            </a:effectRef>
+            <a:fontRef idx="minor">
+              <a:schemeClr val="lt1"/>
+            </a:fontRef>
+          </p:style>
+          <p:txBody>
+            <a:bodyPr rtlCol="0" anchor="ctr"/>
+            <a:lstStyle/>
+            <a:p>
+              <a:pPr algn="ctr"/>
+              <a:endParaRPr lang="en-US"/>
+            </a:p>
+          </p:txBody>
+        </p:sp>
+        <p:sp>
+          <p:nvSpPr>
+            <p:cNvPr id="33" name="Oval 32"/>
+            <p:cNvSpPr/>
+            <p:nvPr/>
+          </p:nvSpPr>
+          <p:spPr>
+            <a:xfrm>
+              <a:off x="10719357" y="3169605"/>
+              <a:ext cx="118872" cy="118872"/>
+            </a:xfrm>
+            <a:prstGeom prst="ellipse">
+              <a:avLst/>
+            </a:prstGeom>
+            <a:solidFill>
+              <a:schemeClr val="bg1"/>
+            </a:solidFill>
+            <a:ln w="19050">
+              <a:solidFill>
+                <a:schemeClr val="tx1"/>
+              </a:solidFill>
+            </a:ln>
+          </p:spPr>
+          <p:style>
+            <a:lnRef idx="2">
+              <a:schemeClr val="accent1">
+                <a:shade val="50000"/>
+              </a:schemeClr>
+            </a:lnRef>
+            <a:fillRef idx="1">
+              <a:schemeClr val="accent1"/>
+            </a:fillRef>
+            <a:effectRef idx="0">
+              <a:schemeClr val="accent1"/>
+            </a:effectRef>
+            <a:fontRef idx="minor">
+              <a:schemeClr val="lt1"/>
+            </a:fontRef>
+          </p:style>
+          <p:txBody>
+            <a:bodyPr rtlCol="0" anchor="ctr"/>
+            <a:lstStyle/>
+            <a:p>
+              <a:pPr algn="ctr"/>
+              <a:endParaRPr lang="en-US"/>
+            </a:p>
+          </p:txBody>
+        </p:sp>
+        <p:sp>
+          <p:nvSpPr>
+            <p:cNvPr id="34" name="Oval 33"/>
+            <p:cNvSpPr/>
+            <p:nvPr/>
+          </p:nvSpPr>
+          <p:spPr>
+            <a:xfrm>
+              <a:off x="10021719" y="3942740"/>
+              <a:ext cx="118872" cy="118872"/>
+            </a:xfrm>
+            <a:prstGeom prst="ellipse">
+              <a:avLst/>
+            </a:prstGeom>
+            <a:solidFill>
+              <a:schemeClr val="bg1"/>
+            </a:solidFill>
+            <a:ln w="19050">
+              <a:solidFill>
+                <a:schemeClr val="tx1"/>
+              </a:solidFill>
+            </a:ln>
+          </p:spPr>
+          <p:style>
+            <a:lnRef idx="2">
+              <a:schemeClr val="accent1">
+                <a:shade val="50000"/>
+              </a:schemeClr>
+            </a:lnRef>
+            <a:fillRef idx="1">
+              <a:schemeClr val="accent1"/>
+            </a:fillRef>
+            <a:effectRef idx="0">
+              <a:schemeClr val="accent1"/>
+            </a:effectRef>
+            <a:fontRef idx="minor">
+              <a:schemeClr val="lt1"/>
+            </a:fontRef>
+          </p:style>
+          <p:txBody>
+            <a:bodyPr rtlCol="0" anchor="ctr"/>
+            <a:lstStyle/>
+            <a:p>
+              <a:pPr algn="ctr"/>
+              <a:endParaRPr lang="en-US"/>
+            </a:p>
+          </p:txBody>
+        </p:sp>
+        <p:sp>
+          <p:nvSpPr>
+            <p:cNvPr id="35" name="Oval 34"/>
+            <p:cNvSpPr/>
+            <p:nvPr/>
+          </p:nvSpPr>
+          <p:spPr>
+            <a:xfrm>
+              <a:off x="13291609" y="3298055"/>
+              <a:ext cx="118872" cy="118872"/>
+            </a:xfrm>
+            <a:prstGeom prst="ellipse">
+              <a:avLst/>
+            </a:prstGeom>
+            <a:solidFill>
+              <a:schemeClr val="bg1"/>
+            </a:solidFill>
+            <a:ln w="19050">
+              <a:solidFill>
+                <a:schemeClr val="tx1"/>
+              </a:solidFill>
+            </a:ln>
+          </p:spPr>
+          <p:style>
+            <a:lnRef idx="2">
+              <a:schemeClr val="accent1">
+                <a:shade val="50000"/>
+              </a:schemeClr>
+            </a:lnRef>
+            <a:fillRef idx="1">
+              <a:schemeClr val="accent1"/>
+            </a:fillRef>
+            <a:effectRef idx="0">
+              <a:schemeClr val="accent1"/>
+            </a:effectRef>
+            <a:fontRef idx="minor">
+              <a:schemeClr val="lt1"/>
+            </a:fontRef>
+          </p:style>
+          <p:txBody>
+            <a:bodyPr rtlCol="0" anchor="ctr"/>
+            <a:lstStyle/>
+            <a:p>
+              <a:pPr algn="ctr"/>
+              <a:endParaRPr lang="en-US"/>
+            </a:p>
+          </p:txBody>
+        </p:sp>
+        <p:sp>
+          <p:nvSpPr>
+            <p:cNvPr id="36" name="Oval 35"/>
+            <p:cNvSpPr/>
+            <p:nvPr/>
+          </p:nvSpPr>
+          <p:spPr>
+            <a:xfrm>
+              <a:off x="13571037" y="3949292"/>
+              <a:ext cx="118872" cy="118872"/>
+            </a:xfrm>
+            <a:prstGeom prst="ellipse">
+              <a:avLst/>
+            </a:prstGeom>
+            <a:solidFill>
+              <a:schemeClr val="bg1"/>
+            </a:solidFill>
+            <a:ln w="19050">
+              <a:solidFill>
+                <a:schemeClr val="tx1"/>
+              </a:solidFill>
+            </a:ln>
+          </p:spPr>
+          <p:style>
+            <a:lnRef idx="2">
+              <a:schemeClr val="accent1">
+                <a:shade val="50000"/>
+              </a:schemeClr>
+            </a:lnRef>
+            <a:fillRef idx="1">
+              <a:schemeClr val="accent1"/>
+            </a:fillRef>
+            <a:effectRef idx="0">
+              <a:schemeClr val="accent1"/>
+            </a:effectRef>
+            <a:fontRef idx="minor">
+              <a:schemeClr val="lt1"/>
+            </a:fontRef>
+          </p:style>
+          <p:txBody>
+            <a:bodyPr rtlCol="0" anchor="ctr"/>
+            <a:lstStyle/>
+            <a:p>
+              <a:pPr algn="ctr"/>
+              <a:endParaRPr lang="en-US"/>
+            </a:p>
+          </p:txBody>
+        </p:sp>
+        <p:sp>
+          <p:nvSpPr>
+            <p:cNvPr id="37" name="Oval 36"/>
+            <p:cNvSpPr/>
+            <p:nvPr/>
+          </p:nvSpPr>
+          <p:spPr>
+            <a:xfrm>
+              <a:off x="14276872" y="3167625"/>
+              <a:ext cx="118872" cy="118872"/>
+            </a:xfrm>
+            <a:prstGeom prst="ellipse">
+              <a:avLst/>
+            </a:prstGeom>
+            <a:solidFill>
+              <a:schemeClr val="bg1"/>
+            </a:solidFill>
+            <a:ln w="19050">
+              <a:solidFill>
+                <a:schemeClr val="tx1"/>
+              </a:solidFill>
+            </a:ln>
+          </p:spPr>
+          <p:style>
+            <a:lnRef idx="2">
+              <a:schemeClr val="accent1">
+                <a:shade val="50000"/>
+              </a:schemeClr>
+            </a:lnRef>
+            <a:fillRef idx="1">
+              <a:schemeClr val="accent1"/>
+            </a:fillRef>
+            <a:effectRef idx="0">
+              <a:schemeClr val="accent1"/>
+            </a:effectRef>
+            <a:fontRef idx="minor">
+              <a:schemeClr val="lt1"/>
+            </a:fontRef>
+          </p:style>
+          <p:txBody>
+            <a:bodyPr rtlCol="0" anchor="ctr"/>
+            <a:lstStyle/>
+            <a:p>
+              <a:pPr algn="ctr"/>
+              <a:endParaRPr lang="en-US"/>
+            </a:p>
+          </p:txBody>
+        </p:sp>
+        <p:sp>
+          <p:nvSpPr>
+            <p:cNvPr id="38" name="Oval 37"/>
+            <p:cNvSpPr/>
+            <p:nvPr/>
+          </p:nvSpPr>
+          <p:spPr>
+            <a:xfrm>
+              <a:off x="13805426" y="3456613"/>
+              <a:ext cx="118872" cy="118872"/>
+            </a:xfrm>
+            <a:prstGeom prst="ellipse">
+              <a:avLst/>
+            </a:prstGeom>
+            <a:solidFill>
+              <a:schemeClr val="tx1"/>
+            </a:solidFill>
+            <a:ln w="19050">
+              <a:solidFill>
+                <a:schemeClr val="tx1"/>
+              </a:solidFill>
+            </a:ln>
+          </p:spPr>
+          <p:style>
+            <a:lnRef idx="2">
+              <a:schemeClr val="accent1">
+                <a:shade val="50000"/>
+              </a:schemeClr>
+            </a:lnRef>
+            <a:fillRef idx="1">
+              <a:schemeClr val="accent1"/>
+            </a:fillRef>
+            <a:effectRef idx="0">
+              <a:schemeClr val="accent1"/>
+            </a:effectRef>
+            <a:fontRef idx="minor">
+              <a:schemeClr val="lt1"/>
+            </a:fontRef>
+          </p:style>
+          <p:txBody>
+            <a:bodyPr rtlCol="0" anchor="ctr"/>
+            <a:lstStyle/>
+            <a:p>
+              <a:pPr algn="ctr"/>
+              <a:endParaRPr lang="en-US"/>
+            </a:p>
+          </p:txBody>
+        </p:sp>
+        <p:sp>
+          <p:nvSpPr>
+            <p:cNvPr id="39" name="TextBox 38"/>
+            <p:cNvSpPr txBox="1"/>
+            <p:nvPr/>
+          </p:nvSpPr>
+          <p:spPr>
+            <a:xfrm>
+              <a:off x="9080776" y="4631785"/>
+              <a:ext cx="2356589" cy="338554"/>
+            </a:xfrm>
+            <a:prstGeom prst="rect">
+              <a:avLst/>
+            </a:prstGeom>
+            <a:noFill/>
+          </p:spPr>
+          <p:txBody>
+            <a:bodyPr wrap="square" rtlCol="0">
+              <a:spAutoFit/>
+            </a:bodyPr>
+            <a:lstStyle/>
+            <a:p>
+              <a:pPr algn="r"/>
+              <a:r>
+                <a:rPr lang="en-US" sz="1600" dirty="0" smtClean="0">
+                  <a:latin typeface="Garamond" panose="02020404030301010803" pitchFamily="18" charset="0"/>
+                </a:rPr>
+                <a:t>x</a:t>
+              </a:r>
+              <a:endParaRPr lang="en-US" sz="1600" dirty="0">
+                <a:latin typeface="Garamond" panose="02020404030301010803" pitchFamily="18" charset="0"/>
+              </a:endParaRPr>
+            </a:p>
+          </p:txBody>
+        </p:sp>
+        <p:sp>
+          <p:nvSpPr>
+            <p:cNvPr id="40" name="TextBox 39"/>
+            <p:cNvSpPr txBox="1"/>
+            <p:nvPr/>
+          </p:nvSpPr>
+          <p:spPr>
+            <a:xfrm>
+              <a:off x="12627131" y="4631785"/>
+              <a:ext cx="2356589" cy="338554"/>
+            </a:xfrm>
+            <a:prstGeom prst="rect">
+              <a:avLst/>
+            </a:prstGeom>
+            <a:noFill/>
+          </p:spPr>
+          <p:txBody>
+            <a:bodyPr wrap="square" rtlCol="0">
+              <a:spAutoFit/>
+            </a:bodyPr>
+            <a:lstStyle/>
+            <a:p>
+              <a:pPr algn="r"/>
+              <a:r>
+                <a:rPr lang="en-US" sz="1600" dirty="0">
+                  <a:latin typeface="Garamond" panose="02020404030301010803" pitchFamily="18" charset="0"/>
+                </a:rPr>
+                <a:t>a</a:t>
+              </a:r>
+            </a:p>
+          </p:txBody>
+        </p:sp>
+        <p:sp>
+          <p:nvSpPr>
+            <p:cNvPr id="42" name="TextBox 41"/>
+            <p:cNvSpPr txBox="1"/>
+            <p:nvPr/>
+          </p:nvSpPr>
+          <p:spPr>
+            <a:xfrm rot="16200000">
+              <a:off x="11295762" y="3277879"/>
+              <a:ext cx="2356589" cy="338554"/>
+            </a:xfrm>
+            <a:prstGeom prst="rect">
+              <a:avLst/>
+            </a:prstGeom>
+            <a:noFill/>
+          </p:spPr>
+          <p:txBody>
+            <a:bodyPr wrap="square" rtlCol="0">
+              <a:spAutoFit/>
+            </a:bodyPr>
+            <a:lstStyle/>
+            <a:p>
+              <a:pPr algn="r"/>
+              <a:r>
+                <a:rPr lang="en-US" sz="1600" dirty="0" smtClean="0">
+                  <a:latin typeface="Garamond" panose="02020404030301010803" pitchFamily="18" charset="0"/>
+                </a:rPr>
+                <a:t>b</a:t>
+              </a:r>
+              <a:endParaRPr lang="en-US" sz="1600" dirty="0">
+                <a:latin typeface="Garamond" panose="02020404030301010803" pitchFamily="18" charset="0"/>
+              </a:endParaRPr>
+            </a:p>
+          </p:txBody>
+        </p:sp>
+        <p:sp>
+          <p:nvSpPr>
+            <p:cNvPr id="43" name="TextBox 42"/>
+            <p:cNvSpPr txBox="1"/>
+            <p:nvPr/>
+          </p:nvSpPr>
+          <p:spPr>
+            <a:xfrm>
+              <a:off x="8971053" y="4596263"/>
+              <a:ext cx="175896" cy="338554"/>
+            </a:xfrm>
+            <a:prstGeom prst="rect">
+              <a:avLst/>
+            </a:prstGeom>
+            <a:noFill/>
+          </p:spPr>
+          <p:txBody>
+            <a:bodyPr wrap="square" rtlCol="0">
+              <a:spAutoFit/>
+            </a:bodyPr>
+            <a:lstStyle/>
+            <a:p>
+              <a:pPr algn="ctr"/>
+              <a:r>
+                <a:rPr lang="en-US" sz="1600" dirty="0" smtClean="0">
+                  <a:latin typeface="Garamond" panose="02020404030301010803" pitchFamily="18" charset="0"/>
+                </a:rPr>
+                <a:t>0</a:t>
+              </a:r>
+              <a:endParaRPr lang="en-US" sz="1600" dirty="0">
+                <a:latin typeface="Garamond" panose="02020404030301010803" pitchFamily="18" charset="0"/>
+              </a:endParaRPr>
+            </a:p>
+          </p:txBody>
+        </p:sp>
+        <p:sp>
+          <p:nvSpPr>
+            <p:cNvPr id="44" name="TextBox 43"/>
+            <p:cNvSpPr txBox="1"/>
+            <p:nvPr/>
+          </p:nvSpPr>
+          <p:spPr>
+            <a:xfrm>
+              <a:off x="12558297" y="4596263"/>
+              <a:ext cx="175896" cy="338554"/>
+            </a:xfrm>
+            <a:prstGeom prst="rect">
+              <a:avLst/>
+            </a:prstGeom>
+            <a:noFill/>
+          </p:spPr>
+          <p:txBody>
+            <a:bodyPr wrap="square" rtlCol="0">
+              <a:spAutoFit/>
+            </a:bodyPr>
+            <a:lstStyle/>
+            <a:p>
+              <a:pPr algn="ctr"/>
+              <a:r>
+                <a:rPr lang="en-US" sz="1600" dirty="0" smtClean="0">
+                  <a:latin typeface="Garamond" panose="02020404030301010803" pitchFamily="18" charset="0"/>
+                </a:rPr>
+                <a:t>0</a:t>
+              </a:r>
+              <a:endParaRPr lang="en-US" sz="1600" dirty="0">
+                <a:latin typeface="Garamond" panose="02020404030301010803" pitchFamily="18" charset="0"/>
+              </a:endParaRPr>
+            </a:p>
+          </p:txBody>
+        </p:sp>
+        <p:sp>
+          <p:nvSpPr>
+            <p:cNvPr id="45" name="TextBox 44"/>
+            <p:cNvSpPr txBox="1"/>
+            <p:nvPr/>
+          </p:nvSpPr>
+          <p:spPr>
+            <a:xfrm>
+              <a:off x="9068076" y="4823862"/>
+              <a:ext cx="2356589" cy="338554"/>
+            </a:xfrm>
+            <a:prstGeom prst="rect">
+              <a:avLst/>
+            </a:prstGeom>
+            <a:noFill/>
+          </p:spPr>
+          <p:txBody>
+            <a:bodyPr wrap="square" rtlCol="0">
+              <a:spAutoFit/>
+            </a:bodyPr>
+            <a:lstStyle/>
+            <a:p>
+              <a:pPr algn="ctr"/>
+              <a:r>
+                <a:rPr lang="en-US" sz="1600" dirty="0" smtClean="0">
+                  <a:latin typeface="Garamond" panose="02020404030301010803" pitchFamily="18" charset="0"/>
+                </a:rPr>
+                <a:t>Image Space</a:t>
+              </a:r>
+              <a:endParaRPr lang="en-US" sz="1600" dirty="0">
+                <a:latin typeface="Garamond" panose="02020404030301010803" pitchFamily="18" charset="0"/>
+              </a:endParaRPr>
+            </a:p>
+          </p:txBody>
+        </p:sp>
+        <p:sp>
+          <p:nvSpPr>
+            <p:cNvPr id="46" name="TextBox 45"/>
+            <p:cNvSpPr txBox="1"/>
+            <p:nvPr/>
+          </p:nvSpPr>
+          <p:spPr>
+            <a:xfrm>
+              <a:off x="12627130" y="4823862"/>
+              <a:ext cx="2356589" cy="338554"/>
+            </a:xfrm>
+            <a:prstGeom prst="rect">
+              <a:avLst/>
+            </a:prstGeom>
+            <a:noFill/>
+          </p:spPr>
+          <p:txBody>
+            <a:bodyPr wrap="square" rtlCol="0">
+              <a:spAutoFit/>
+            </a:bodyPr>
+            <a:lstStyle/>
+            <a:p>
+              <a:pPr algn="ctr"/>
+              <a:r>
+                <a:rPr lang="en-US" sz="1600" dirty="0" smtClean="0">
+                  <a:latin typeface="Garamond" panose="02020404030301010803" pitchFamily="18" charset="0"/>
+                </a:rPr>
+                <a:t>Hough Space</a:t>
+              </a:r>
+              <a:endParaRPr lang="en-US" sz="1600" dirty="0">
+                <a:latin typeface="Garamond" panose="02020404030301010803" pitchFamily="18" charset="0"/>
+              </a:endParaRPr>
+            </a:p>
+          </p:txBody>
+        </p:sp>
+        <p:sp>
+          <p:nvSpPr>
+            <p:cNvPr id="53" name="Oval 52"/>
+            <p:cNvSpPr/>
+            <p:nvPr/>
+          </p:nvSpPr>
+          <p:spPr>
+            <a:xfrm>
+              <a:off x="10258475" y="3462769"/>
+              <a:ext cx="118872" cy="118872"/>
+            </a:xfrm>
+            <a:prstGeom prst="ellipse">
+              <a:avLst/>
+            </a:prstGeom>
+            <a:solidFill>
+              <a:schemeClr val="tx1"/>
+            </a:solidFill>
+            <a:ln w="19050">
+              <a:solidFill>
+                <a:schemeClr val="tx1"/>
+              </a:solidFill>
+            </a:ln>
+          </p:spPr>
+          <p:style>
+            <a:lnRef idx="2">
+              <a:schemeClr val="accent1">
+                <a:shade val="50000"/>
+              </a:schemeClr>
+            </a:lnRef>
+            <a:fillRef idx="1">
+              <a:schemeClr val="accent1"/>
+            </a:fillRef>
+            <a:effectRef idx="0">
+              <a:schemeClr val="accent1"/>
+            </a:effectRef>
+            <a:fontRef idx="minor">
+              <a:schemeClr val="lt1"/>
+            </a:fontRef>
+          </p:style>
+          <p:txBody>
+            <a:bodyPr rtlCol="0" anchor="ctr"/>
+            <a:lstStyle/>
+            <a:p>
+              <a:pPr algn="ctr"/>
+              <a:endParaRPr lang="en-US"/>
+            </a:p>
+          </p:txBody>
+        </p:sp>
+        <p:cxnSp>
+          <p:nvCxnSpPr>
+            <p:cNvPr id="55" name="Straight Arrow Connector 54"/>
+            <p:cNvCxnSpPr>
+              <a:stCxn id="32" idx="6"/>
+              <a:endCxn id="35" idx="2"/>
+            </p:cNvCxnSpPr>
+            <p:nvPr/>
+          </p:nvCxnSpPr>
+          <p:spPr>
+            <a:xfrm>
+              <a:off x="9844835" y="3357491"/>
+              <a:ext cx="3446774" cy="0"/>
+            </a:xfrm>
+            <a:prstGeom prst="straightConnector1">
+              <a:avLst/>
+            </a:prstGeom>
+            <a:ln w="12700">
+              <a:solidFill>
+                <a:schemeClr val="tx1"/>
+              </a:solidFill>
+              <a:headEnd type="triangle"/>
+              <a:tailEnd type="triangle"/>
+            </a:ln>
+          </p:spPr>
+          <p:style>
+            <a:lnRef idx="1">
+              <a:schemeClr val="accent1"/>
+            </a:lnRef>
+            <a:fillRef idx="0">
+              <a:schemeClr val="accent1"/>
+            </a:fillRef>
+            <a:effectRef idx="0">
+              <a:schemeClr val="accent1"/>
+            </a:effectRef>
+            <a:fontRef idx="minor">
+              <a:schemeClr val="tx1"/>
+            </a:fontRef>
+          </p:style>
+        </p:cxnSp>
+        <p:cxnSp>
+          <p:nvCxnSpPr>
+            <p:cNvPr id="57" name="Straight Arrow Connector 56"/>
+            <p:cNvCxnSpPr>
+              <a:stCxn id="33" idx="6"/>
+              <a:endCxn id="37" idx="2"/>
+            </p:cNvCxnSpPr>
+            <p:nvPr/>
+          </p:nvCxnSpPr>
+          <p:spPr>
+            <a:xfrm flipV="1">
+              <a:off x="10838229" y="3227061"/>
+              <a:ext cx="3438643" cy="1980"/>
+            </a:xfrm>
+            <a:prstGeom prst="straightConnector1">
+              <a:avLst/>
+            </a:prstGeom>
+            <a:ln w="12700">
+              <a:solidFill>
+                <a:schemeClr val="tx1"/>
+              </a:solidFill>
+              <a:headEnd type="triangle"/>
+              <a:tailEnd type="triangle"/>
+            </a:ln>
+          </p:spPr>
+          <p:style>
+            <a:lnRef idx="1">
+              <a:schemeClr val="accent1"/>
+            </a:lnRef>
+            <a:fillRef idx="0">
+              <a:schemeClr val="accent1"/>
+            </a:fillRef>
+            <a:effectRef idx="0">
+              <a:schemeClr val="accent1"/>
+            </a:effectRef>
+            <a:fontRef idx="minor">
+              <a:schemeClr val="tx1"/>
+            </a:fontRef>
+          </p:style>
+        </p:cxnSp>
+        <p:cxnSp>
+          <p:nvCxnSpPr>
+            <p:cNvPr id="59" name="Straight Arrow Connector 58"/>
+            <p:cNvCxnSpPr>
+              <a:stCxn id="34" idx="6"/>
+              <a:endCxn id="36" idx="2"/>
+            </p:cNvCxnSpPr>
+            <p:nvPr/>
+          </p:nvCxnSpPr>
+          <p:spPr>
+            <a:xfrm>
+              <a:off x="10140591" y="4002176"/>
+              <a:ext cx="3430446" cy="6552"/>
+            </a:xfrm>
+            <a:prstGeom prst="straightConnector1">
+              <a:avLst/>
+            </a:prstGeom>
+            <a:ln w="12700">
+              <a:solidFill>
+                <a:schemeClr val="tx1"/>
+              </a:solidFill>
+              <a:headEnd type="triangle"/>
+              <a:tailEnd type="triangle"/>
+            </a:ln>
+          </p:spPr>
+          <p:style>
+            <a:lnRef idx="1">
+              <a:schemeClr val="accent1"/>
+            </a:lnRef>
+            <a:fillRef idx="0">
+              <a:schemeClr val="accent1"/>
+            </a:fillRef>
+            <a:effectRef idx="0">
+              <a:schemeClr val="accent1"/>
+            </a:effectRef>
+            <a:fontRef idx="minor">
+              <a:schemeClr val="tx1"/>
+            </a:fontRef>
+          </p:style>
+        </p:cxnSp>
+        <p:cxnSp>
+          <p:nvCxnSpPr>
+            <p:cNvPr id="61" name="Straight Arrow Connector 60"/>
+            <p:cNvCxnSpPr>
+              <a:stCxn id="53" idx="6"/>
+              <a:endCxn id="38" idx="2"/>
+            </p:cNvCxnSpPr>
+            <p:nvPr/>
+          </p:nvCxnSpPr>
+          <p:spPr>
+            <a:xfrm flipV="1">
+              <a:off x="10377347" y="3516049"/>
+              <a:ext cx="3428079" cy="6156"/>
+            </a:xfrm>
+            <a:prstGeom prst="straightConnector1">
+              <a:avLst/>
+            </a:prstGeom>
+            <a:ln w="12700">
+              <a:solidFill>
+                <a:schemeClr val="tx1"/>
+              </a:solidFill>
+              <a:headEnd type="triangle"/>
+              <a:tailEnd type="triangle"/>
+            </a:ln>
+          </p:spPr>
+          <p:style>
+            <a:lnRef idx="1">
+              <a:schemeClr val="accent1"/>
+            </a:lnRef>
+            <a:fillRef idx="0">
+              <a:schemeClr val="accent1"/>
+            </a:fillRef>
+            <a:effectRef idx="0">
+              <a:schemeClr val="accent1"/>
+            </a:effectRef>
+            <a:fontRef idx="minor">
+              <a:schemeClr val="tx1"/>
+            </a:fontRef>
+          </p:style>
+        </p:cxnSp>
+      </p:grpSp>
+    </p:spTree>
+    <p:extLst>
+      <p:ext uri="{BB962C8B-B14F-4D97-AF65-F5344CB8AC3E}">
+        <p14:creationId xmlns:p14="http://schemas.microsoft.com/office/powerpoint/2010/main" val="2843238838"/>
+      </p:ext>
+    </p:extLst>
+  </p:cSld>
+  <p:clrMapOvr>
+    <a:masterClrMapping/>
+  </p:clrMapOvr>
+  <p:timing>
+    <p:tnLst>
+      <p:par>
+        <p:cTn id="1" dur="indefinite" restart="never" nodeType="tmRoot">
+          <p:childTnLst>
+            <p:seq concurrent="1" nextAc="seek">
+              <p:cTn id="2" dur="indefinite" nodeType="mainSeq">
+                <p:childTnLst>
+                  <p:par>
+                    <p:cTn id="3" fill="hold">
+                      <p:stCondLst>
+                        <p:cond delay="indefinite"/>
+                        <p:cond evt="onBegin" delay="0">
+                          <p:tn val="2"/>
+                        </p:cond>
+                      </p:stCondLst>
+                      <p:childTnLst>
+                        <p:par>
+                          <p:cTn id="4" fill="hold">
+                            <p:stCondLst>
+                              <p:cond delay="0"/>
+                            </p:stCondLst>
+                            <p:childTnLst>
+                              <p:par>
+                                <p:cTn id="5" presetID="1" presetClass="entr" presetSubtype="0" fill="hold" grpId="0" nodeType="withEffect">
+                                  <p:stCondLst>
+                                    <p:cond delay="0"/>
+                                  </p:stCondLst>
+                                  <p:childTnLst>
+                                    <p:set>
+                                      <p:cBhvr>
+                                        <p:cTn id="6" dur="1" fill="hold">
+                                          <p:stCondLst>
+                                            <p:cond delay="0"/>
+                                          </p:stCondLst>
+                                        </p:cTn>
+                                        <p:tgtEl>
+                                          <p:spTgt spid="19"/>
+                                        </p:tgtEl>
+                                        <p:attrNameLst>
+                                          <p:attrName>style.visibility</p:attrName>
+                                        </p:attrNameLst>
+                                      </p:cBhvr>
+                                      <p:to>
+                                        <p:strVal val="visible"/>
+                                      </p:to>
+                                    </p:set>
+                                  </p:childTnLst>
+                                </p:cTn>
+                              </p:par>
+                            </p:childTnLst>
+                          </p:cTn>
+                        </p:par>
+                      </p:childTnLst>
+                    </p:cTn>
+                  </p:par>
+                </p:childTnLst>
+              </p:cTn>
+              <p:prevCondLst>
+                <p:cond evt="onPrev" delay="0">
+                  <p:tgtEl>
+                    <p:sldTgt/>
+                  </p:tgtEl>
+                </p:cond>
+              </p:prevCondLst>
+              <p:nextCondLst>
+                <p:cond evt="onNext" delay="0">
+                  <p:tgtEl>
+                    <p:sldTgt/>
+                  </p:tgtEl>
+                </p:cond>
+              </p:nextCondLst>
+            </p:seq>
+          </p:childTnLst>
+        </p:cTn>
+      </p:par>
+    </p:tnLst>
+    <p:bldLst>
+      <p:bldP spid="19" grpId="0"/>
+    </p:bldLst>
+  </p:timing>
+</p:sld>
+</file>
+
+<file path=ppt/slides/slide7.xml><?xml version="1.0" encoding="utf-8"?>
+<p:sld xmlns:a="http://schemas.openxmlformats.org/drawingml/2006/main" xmlns:r="http://schemas.openxmlformats.org/officeDocument/2006/relationships" xmlns:p="http://schemas.openxmlformats.org/presentationml/2006/main">
+  <p:cSld>
+    <p:spTree>
+      <p:nvGrpSpPr>
+        <p:cNvPr id="1" name=""/>
+        <p:cNvGrpSpPr/>
+        <p:nvPr/>
+      </p:nvGrpSpPr>
+      <p:grpSpPr>
+        <a:xfrm>
+          <a:off x="0" y="0"/>
+          <a:ext cx="0" cy="0"/>
+          <a:chOff x="0" y="0"/>
+          <a:chExt cx="0" cy="0"/>
+        </a:xfrm>
+      </p:grpSpPr>
+      <p:pic>
+        <p:nvPicPr>
+          <p:cNvPr id="2" name="Picture 1"/>
+          <p:cNvPicPr>
+            <a:picLocks noChangeAspect="1"/>
+          </p:cNvPicPr>
+          <p:nvPr/>
+        </p:nvPicPr>
+        <p:blipFill>
+          <a:blip r:embed="rId2"/>
+          <a:stretch>
+            <a:fillRect/>
+          </a:stretch>
+        </p:blipFill>
+        <p:spPr>
+          <a:xfrm>
+            <a:off x="8520112" y="1443037"/>
+            <a:ext cx="2752725" cy="3933825"/>
+          </a:xfrm>
+          <a:prstGeom prst="rect">
+            <a:avLst/>
+          </a:prstGeom>
+        </p:spPr>
+      </p:pic>
+      <p:grpSp>
+        <p:nvGrpSpPr>
+          <p:cNvPr id="49" name="Group 48"/>
+          <p:cNvGrpSpPr/>
+          <p:nvPr/>
+        </p:nvGrpSpPr>
+        <p:grpSpPr>
+          <a:xfrm>
+            <a:off x="3172689" y="1590675"/>
+            <a:ext cx="3707218" cy="3171825"/>
+            <a:chOff x="3172689" y="1590675"/>
+            <a:chExt cx="3707218" cy="3171825"/>
+          </a:xfrm>
+        </p:grpSpPr>
+        <p:cxnSp>
+          <p:nvCxnSpPr>
+            <p:cNvPr id="4" name="Straight Arrow Connector 3"/>
+            <p:cNvCxnSpPr/>
+            <p:nvPr/>
+          </p:nvCxnSpPr>
+          <p:spPr>
+            <a:xfrm flipV="1">
+              <a:off x="3533775" y="1590675"/>
+              <a:ext cx="0" cy="2457450"/>
+            </a:xfrm>
+            <a:prstGeom prst="straightConnector1">
+              <a:avLst/>
+            </a:prstGeom>
+            <a:ln w="25400">
+              <a:solidFill>
+                <a:schemeClr val="tx1"/>
+              </a:solidFill>
+              <a:tailEnd type="triangle"/>
+            </a:ln>
+          </p:spPr>
+          <p:style>
+            <a:lnRef idx="1">
+              <a:schemeClr val="accent1"/>
+            </a:lnRef>
+            <a:fillRef idx="0">
+              <a:schemeClr val="accent1"/>
+            </a:fillRef>
+            <a:effectRef idx="0">
+              <a:schemeClr val="accent1"/>
+            </a:effectRef>
+            <a:fontRef idx="minor">
+              <a:schemeClr val="tx1"/>
+            </a:fontRef>
+          </p:style>
+        </p:cxnSp>
+        <p:cxnSp>
+          <p:nvCxnSpPr>
+            <p:cNvPr id="6" name="Straight Arrow Connector 5"/>
+            <p:cNvCxnSpPr/>
+            <p:nvPr/>
+          </p:nvCxnSpPr>
+          <p:spPr>
+            <a:xfrm flipV="1">
+              <a:off x="3524250" y="3305175"/>
+              <a:ext cx="2190750" cy="733425"/>
+            </a:xfrm>
+            <a:prstGeom prst="straightConnector1">
+              <a:avLst/>
+            </a:prstGeom>
+            <a:ln w="25400">
+              <a:solidFill>
+                <a:schemeClr val="tx1"/>
+              </a:solidFill>
+              <a:tailEnd type="triangle"/>
+            </a:ln>
+          </p:spPr>
+          <p:style>
+            <a:lnRef idx="1">
+              <a:schemeClr val="accent1"/>
+            </a:lnRef>
+            <a:fillRef idx="0">
+              <a:schemeClr val="accent1"/>
+            </a:fillRef>
+            <a:effectRef idx="0">
+              <a:schemeClr val="accent1"/>
+            </a:effectRef>
+            <a:fontRef idx="minor">
+              <a:schemeClr val="tx1"/>
+            </a:fontRef>
+          </p:style>
+        </p:cxnSp>
+        <p:cxnSp>
+          <p:nvCxnSpPr>
+            <p:cNvPr id="8" name="Straight Arrow Connector 7"/>
+            <p:cNvCxnSpPr/>
+            <p:nvPr/>
+          </p:nvCxnSpPr>
+          <p:spPr>
+            <a:xfrm>
+              <a:off x="3533775" y="4048125"/>
+              <a:ext cx="1362075" cy="714375"/>
+            </a:xfrm>
+            <a:prstGeom prst="straightConnector1">
+              <a:avLst/>
+            </a:prstGeom>
+            <a:ln w="25400">
+              <a:solidFill>
+                <a:schemeClr val="tx1"/>
+              </a:solidFill>
+              <a:tailEnd type="triangle"/>
+            </a:ln>
+          </p:spPr>
+          <p:style>
+            <a:lnRef idx="1">
+              <a:schemeClr val="accent1"/>
+            </a:lnRef>
+            <a:fillRef idx="0">
+              <a:schemeClr val="accent1"/>
+            </a:fillRef>
+            <a:effectRef idx="0">
+              <a:schemeClr val="accent1"/>
+            </a:effectRef>
+            <a:fontRef idx="minor">
+              <a:schemeClr val="tx1"/>
+            </a:fontRef>
+          </p:style>
+        </p:cxnSp>
+        <p:cxnSp>
+          <p:nvCxnSpPr>
+            <p:cNvPr id="11" name="Straight Connector 10"/>
+            <p:cNvCxnSpPr/>
+            <p:nvPr/>
+          </p:nvCxnSpPr>
+          <p:spPr>
+            <a:xfrm flipH="1" flipV="1">
+              <a:off x="3586162" y="2157413"/>
+              <a:ext cx="1119188" cy="2014537"/>
+            </a:xfrm>
+            <a:prstGeom prst="line">
+              <a:avLst/>
+            </a:prstGeom>
+            <a:ln w="19050">
+              <a:solidFill>
+                <a:schemeClr val="tx1"/>
+              </a:solidFill>
+            </a:ln>
+          </p:spPr>
+          <p:style>
+            <a:lnRef idx="1">
+              <a:schemeClr val="accent1"/>
+            </a:lnRef>
+            <a:fillRef idx="0">
+              <a:schemeClr val="accent1"/>
+            </a:fillRef>
+            <a:effectRef idx="0">
+              <a:schemeClr val="accent1"/>
+            </a:effectRef>
+            <a:fontRef idx="minor">
+              <a:schemeClr val="tx1"/>
+            </a:fontRef>
+          </p:style>
+        </p:cxnSp>
+        <p:cxnSp>
+          <p:nvCxnSpPr>
+            <p:cNvPr id="13" name="Straight Connector 12"/>
+            <p:cNvCxnSpPr/>
+            <p:nvPr/>
+          </p:nvCxnSpPr>
+          <p:spPr>
+            <a:xfrm flipV="1">
+              <a:off x="4705350" y="2164079"/>
+              <a:ext cx="1212532" cy="2007871"/>
+            </a:xfrm>
+            <a:prstGeom prst="line">
+              <a:avLst/>
+            </a:prstGeom>
+            <a:ln w="19050">
+              <a:solidFill>
+                <a:schemeClr val="tx1"/>
+              </a:solidFill>
+            </a:ln>
+          </p:spPr>
+          <p:style>
+            <a:lnRef idx="1">
+              <a:schemeClr val="accent1"/>
+            </a:lnRef>
+            <a:fillRef idx="0">
+              <a:schemeClr val="accent1"/>
+            </a:fillRef>
+            <a:effectRef idx="0">
+              <a:schemeClr val="accent1"/>
+            </a:effectRef>
+            <a:fontRef idx="minor">
+              <a:schemeClr val="tx1"/>
+            </a:fontRef>
+          </p:style>
+        </p:cxnSp>
+        <p:sp>
+          <p:nvSpPr>
+            <p:cNvPr id="23" name="Oval 22"/>
+            <p:cNvSpPr/>
+            <p:nvPr/>
+          </p:nvSpPr>
+          <p:spPr>
+            <a:xfrm>
+              <a:off x="3810001" y="2400300"/>
+              <a:ext cx="1883664" cy="242888"/>
+            </a:xfrm>
+            <a:prstGeom prst="ellipse">
+              <a:avLst/>
+            </a:prstGeom>
+            <a:noFill/>
+            <a:ln w="19050">
+              <a:solidFill>
+                <a:schemeClr val="tx1"/>
+              </a:solidFill>
+            </a:ln>
+          </p:spPr>
+          <p:style>
+            <a:lnRef idx="2">
+              <a:schemeClr val="accent1">
+                <a:shade val="50000"/>
+              </a:schemeClr>
+            </a:lnRef>
+            <a:fillRef idx="1">
+              <a:schemeClr val="accent1"/>
+            </a:fillRef>
+            <a:effectRef idx="0">
+              <a:schemeClr val="accent1"/>
+            </a:effectRef>
+            <a:fontRef idx="minor">
+              <a:schemeClr val="lt1"/>
+            </a:fontRef>
+          </p:style>
+          <p:txBody>
+            <a:bodyPr rtlCol="0" anchor="ctr"/>
+            <a:lstStyle/>
+            <a:p>
+              <a:pPr algn="ctr"/>
+              <a:endParaRPr lang="en-US"/>
+            </a:p>
+          </p:txBody>
+        </p:sp>
+        <p:sp>
+          <p:nvSpPr>
+            <p:cNvPr id="48" name="TextBox 47"/>
+            <p:cNvSpPr txBox="1"/>
+            <p:nvPr/>
+          </p:nvSpPr>
+          <p:spPr>
+            <a:xfrm rot="1677040">
+              <a:off x="3347194" y="4354325"/>
+              <a:ext cx="1447800" cy="369332"/>
+            </a:xfrm>
+            <a:prstGeom prst="rect">
+              <a:avLst/>
+            </a:prstGeom>
+            <a:noFill/>
+            <a:ln>
+              <a:noFill/>
+            </a:ln>
+          </p:spPr>
+          <p:style>
+            <a:lnRef idx="2">
+              <a:schemeClr val="dk1"/>
+            </a:lnRef>
+            <a:fillRef idx="1">
+              <a:schemeClr val="lt1"/>
+            </a:fillRef>
+            <a:effectRef idx="0">
+              <a:schemeClr val="dk1"/>
+            </a:effectRef>
+            <a:fontRef idx="minor">
+              <a:schemeClr val="dk1"/>
+            </a:fontRef>
+          </p:style>
+          <p:txBody>
+            <a:bodyPr wrap="square" rtlCol="0">
+              <a:spAutoFit/>
+            </a:bodyPr>
+            <a:lstStyle/>
+            <a:p>
+              <a:pPr algn="r"/>
+              <a:r>
+                <a:rPr lang="en-US" dirty="0" smtClean="0">
+                  <a:latin typeface="Garamond" panose="02020404030301010803" pitchFamily="18" charset="0"/>
+                </a:rPr>
+                <a:t>a</a:t>
+              </a:r>
+              <a:endParaRPr lang="en-US" dirty="0">
+                <a:latin typeface="Garamond" panose="02020404030301010803" pitchFamily="18" charset="0"/>
+              </a:endParaRPr>
+            </a:p>
+          </p:txBody>
+        </p:sp>
+        <p:sp>
+          <p:nvSpPr>
+            <p:cNvPr id="56" name="TextBox 55"/>
+            <p:cNvSpPr txBox="1"/>
+            <p:nvPr/>
+          </p:nvSpPr>
+          <p:spPr>
+            <a:xfrm rot="20533489">
+              <a:off x="3386729" y="3354537"/>
+              <a:ext cx="2235293" cy="369332"/>
+            </a:xfrm>
+            <a:prstGeom prst="rect">
+              <a:avLst/>
+            </a:prstGeom>
+            <a:noFill/>
+            <a:ln>
+              <a:noFill/>
+            </a:ln>
+          </p:spPr>
+          <p:style>
+            <a:lnRef idx="2">
+              <a:schemeClr val="dk1"/>
+            </a:lnRef>
+            <a:fillRef idx="1">
+              <a:schemeClr val="lt1"/>
+            </a:fillRef>
+            <a:effectRef idx="0">
+              <a:schemeClr val="dk1"/>
+            </a:effectRef>
+            <a:fontRef idx="minor">
+              <a:schemeClr val="dk1"/>
+            </a:fontRef>
+          </p:style>
+          <p:txBody>
+            <a:bodyPr wrap="square" rtlCol="0">
+              <a:spAutoFit/>
+            </a:bodyPr>
+            <a:lstStyle/>
+            <a:p>
+              <a:pPr algn="r"/>
+              <a:r>
+                <a:rPr lang="en-US" dirty="0">
+                  <a:latin typeface="Garamond" panose="02020404030301010803" pitchFamily="18" charset="0"/>
+                </a:rPr>
+                <a:t>b</a:t>
+              </a:r>
+            </a:p>
+          </p:txBody>
+        </p:sp>
+        <p:sp>
+          <p:nvSpPr>
+            <p:cNvPr id="58" name="TextBox 57"/>
+            <p:cNvSpPr txBox="1"/>
+            <p:nvPr/>
+          </p:nvSpPr>
+          <p:spPr>
+            <a:xfrm rot="16200000">
+              <a:off x="2239708" y="2718077"/>
+              <a:ext cx="2235293" cy="369332"/>
+            </a:xfrm>
+            <a:prstGeom prst="rect">
+              <a:avLst/>
+            </a:prstGeom>
+            <a:noFill/>
+            <a:ln>
+              <a:noFill/>
+            </a:ln>
+          </p:spPr>
+          <p:style>
+            <a:lnRef idx="2">
+              <a:schemeClr val="dk1"/>
+            </a:lnRef>
+            <a:fillRef idx="1">
+              <a:schemeClr val="lt1"/>
+            </a:fillRef>
+            <a:effectRef idx="0">
+              <a:schemeClr val="dk1"/>
+            </a:effectRef>
+            <a:fontRef idx="minor">
+              <a:schemeClr val="dk1"/>
+            </a:fontRef>
+          </p:style>
+          <p:txBody>
+            <a:bodyPr wrap="square" rtlCol="0">
+              <a:spAutoFit/>
+            </a:bodyPr>
+            <a:lstStyle/>
+            <a:p>
+              <a:pPr algn="r"/>
+              <a:r>
+                <a:rPr lang="en-US" dirty="0" smtClean="0">
+                  <a:latin typeface="Garamond" panose="02020404030301010803" pitchFamily="18" charset="0"/>
+                </a:rPr>
+                <a:t>r</a:t>
+              </a:r>
+              <a:endParaRPr lang="en-US" dirty="0">
+                <a:latin typeface="Garamond" panose="02020404030301010803" pitchFamily="18" charset="0"/>
+              </a:endParaRPr>
+            </a:p>
+          </p:txBody>
+        </p:sp>
+        <p:cxnSp>
+          <p:nvCxnSpPr>
+            <p:cNvPr id="65" name="Straight Connector 64"/>
+            <p:cNvCxnSpPr/>
+            <p:nvPr/>
+          </p:nvCxnSpPr>
+          <p:spPr>
+            <a:xfrm flipH="1" flipV="1">
+              <a:off x="4548187" y="2157413"/>
+              <a:ext cx="1119188" cy="2014537"/>
+            </a:xfrm>
+            <a:prstGeom prst="line">
+              <a:avLst/>
+            </a:prstGeom>
+            <a:ln w="19050">
+              <a:solidFill>
+                <a:schemeClr val="tx1"/>
+              </a:solidFill>
+            </a:ln>
+          </p:spPr>
+          <p:style>
+            <a:lnRef idx="1">
+              <a:schemeClr val="accent1"/>
+            </a:lnRef>
+            <a:fillRef idx="0">
+              <a:schemeClr val="accent1"/>
+            </a:fillRef>
+            <a:effectRef idx="0">
+              <a:schemeClr val="accent1"/>
+            </a:effectRef>
+            <a:fontRef idx="minor">
+              <a:schemeClr val="tx1"/>
+            </a:fontRef>
+          </p:style>
+        </p:cxnSp>
+        <p:cxnSp>
+          <p:nvCxnSpPr>
+            <p:cNvPr id="66" name="Straight Connector 65"/>
+            <p:cNvCxnSpPr/>
+            <p:nvPr/>
+          </p:nvCxnSpPr>
+          <p:spPr>
+            <a:xfrm flipV="1">
+              <a:off x="5667375" y="2164079"/>
+              <a:ext cx="1212532" cy="2007871"/>
+            </a:xfrm>
+            <a:prstGeom prst="line">
+              <a:avLst/>
+            </a:prstGeom>
+            <a:ln w="19050">
+              <a:solidFill>
+                <a:schemeClr val="tx1"/>
+              </a:solidFill>
+            </a:ln>
+          </p:spPr>
+          <p:style>
+            <a:lnRef idx="1">
+              <a:schemeClr val="accent1"/>
+            </a:lnRef>
+            <a:fillRef idx="0">
+              <a:schemeClr val="accent1"/>
+            </a:fillRef>
+            <a:effectRef idx="0">
+              <a:schemeClr val="accent1"/>
+            </a:effectRef>
+            <a:fontRef idx="minor">
+              <a:schemeClr val="tx1"/>
+            </a:fontRef>
+          </p:style>
+        </p:cxnSp>
+        <p:sp>
+          <p:nvSpPr>
+            <p:cNvPr id="68" name="Oval 67"/>
+            <p:cNvSpPr/>
+            <p:nvPr/>
+          </p:nvSpPr>
+          <p:spPr>
+            <a:xfrm>
+              <a:off x="4757736" y="2400300"/>
+              <a:ext cx="1883664" cy="242888"/>
+            </a:xfrm>
+            <a:prstGeom prst="ellipse">
+              <a:avLst/>
+            </a:prstGeom>
+            <a:noFill/>
+            <a:ln w="19050">
+              <a:solidFill>
+                <a:schemeClr val="tx1"/>
+              </a:solidFill>
+            </a:ln>
+          </p:spPr>
+          <p:style>
+            <a:lnRef idx="2">
+              <a:schemeClr val="accent1">
+                <a:shade val="50000"/>
+              </a:schemeClr>
+            </a:lnRef>
+            <a:fillRef idx="1">
+              <a:schemeClr val="accent1"/>
+            </a:fillRef>
+            <a:effectRef idx="0">
+              <a:schemeClr val="accent1"/>
+            </a:effectRef>
+            <a:fontRef idx="minor">
+              <a:schemeClr val="lt1"/>
+            </a:fontRef>
+          </p:style>
+          <p:txBody>
+            <a:bodyPr rtlCol="0" anchor="ctr"/>
+            <a:lstStyle/>
+            <a:p>
+              <a:pPr algn="ctr"/>
+              <a:endParaRPr lang="en-US"/>
+            </a:p>
+          </p:txBody>
+        </p:sp>
+      </p:grpSp>
+    </p:spTree>
+    <p:extLst>
+      <p:ext uri="{BB962C8B-B14F-4D97-AF65-F5344CB8AC3E}">
+        <p14:creationId xmlns:p14="http://schemas.microsoft.com/office/powerpoint/2010/main" val="1472014168"/>
+      </p:ext>
+    </p:extLst>
+  </p:cSld>
+  <p:clrMapOvr>
+    <a:masterClrMapping/>
+  </p:clrMapOvr>
+  <p:timing>
+    <p:tnLst>
+      <p:par>
+        <p:cTn id="1" dur="indefinite" restart="never" nodeType="tmRoot"/>
+      </p:par>
+    </p:tnLst>
+  </p:timing>
+</p:sld>
+</file>
+
+<file path=ppt/slides/slide8.xml><?xml version="1.0" encoding="utf-8"?>
+<p:sld xmlns:a="http://schemas.openxmlformats.org/drawingml/2006/main" xmlns:r="http://schemas.openxmlformats.org/officeDocument/2006/relationships" xmlns:p="http://schemas.openxmlformats.org/presentationml/2006/main">
+  <p:cSld>
+    <p:spTree>
+      <p:nvGrpSpPr>
+        <p:cNvPr id="1" name=""/>
+        <p:cNvGrpSpPr/>
+        <p:nvPr/>
+      </p:nvGrpSpPr>
+      <p:grpSpPr>
+        <a:xfrm>
+          <a:off x="0" y="0"/>
+          <a:ext cx="0" cy="0"/>
+          <a:chOff x="0" y="0"/>
+          <a:chExt cx="0" cy="0"/>
+        </a:xfrm>
+      </p:grpSpPr>
+    </p:spTree>
+    <p:extLst>
+      <p:ext uri="{BB962C8B-B14F-4D97-AF65-F5344CB8AC3E}">
+        <p14:creationId xmlns:p14="http://schemas.microsoft.com/office/powerpoint/2010/main" val="24310952"/>
       </p:ext>
     </p:extLst>
   </p:cSld>

</xml_diff>